<commit_message>
Slides presented to Masoud are uploaded.
</commit_message>
<xml_diff>
--- a/Dynamical simulation of a 2-step refrigeration circle.pptx
+++ b/Dynamical simulation of a 2-step refrigeration circle.pptx
@@ -7,20 +7,22 @@
   <p:sldIdLst>
     <p:sldId id="256" r:id="rId2"/>
     <p:sldId id="258" r:id="rId3"/>
-    <p:sldId id="271" r:id="rId4"/>
-    <p:sldId id="263" r:id="rId5"/>
-    <p:sldId id="257" r:id="rId6"/>
-    <p:sldId id="259" r:id="rId7"/>
-    <p:sldId id="260" r:id="rId8"/>
-    <p:sldId id="261" r:id="rId9"/>
-    <p:sldId id="262" r:id="rId10"/>
-    <p:sldId id="264" r:id="rId11"/>
-    <p:sldId id="265" r:id="rId12"/>
-    <p:sldId id="266" r:id="rId13"/>
-    <p:sldId id="267" r:id="rId14"/>
-    <p:sldId id="268" r:id="rId15"/>
-    <p:sldId id="269" r:id="rId16"/>
-    <p:sldId id="270" r:id="rId17"/>
+    <p:sldId id="273" r:id="rId4"/>
+    <p:sldId id="271" r:id="rId5"/>
+    <p:sldId id="263" r:id="rId6"/>
+    <p:sldId id="257" r:id="rId7"/>
+    <p:sldId id="259" r:id="rId8"/>
+    <p:sldId id="260" r:id="rId9"/>
+    <p:sldId id="261" r:id="rId10"/>
+    <p:sldId id="262" r:id="rId11"/>
+    <p:sldId id="264" r:id="rId12"/>
+    <p:sldId id="265" r:id="rId13"/>
+    <p:sldId id="266" r:id="rId14"/>
+    <p:sldId id="267" r:id="rId15"/>
+    <p:sldId id="268" r:id="rId16"/>
+    <p:sldId id="272" r:id="rId17"/>
+    <p:sldId id="269" r:id="rId18"/>
+    <p:sldId id="270" r:id="rId19"/>
   </p:sldIdLst>
   <p:sldSz cx="12192000" cy="6858000"/>
   <p:notesSz cx="6858000" cy="9144000"/>
@@ -119,6 +121,22 @@
       </a:defRPr>
     </a:lvl9pPr>
   </p:defaultTextStyle>
+  <p:extLst>
+    <p:ext uri="{EFAFB233-063F-42B5-8137-9DF3F51BA10A}">
+      <p15:sldGuideLst xmlns:p15="http://schemas.microsoft.com/office/powerpoint/2012/main">
+        <p15:guide id="1" orient="horz" pos="2160">
+          <p15:clr>
+            <a:srgbClr val="A4A3A4"/>
+          </p15:clr>
+        </p15:guide>
+        <p15:guide id="2" pos="3840">
+          <p15:clr>
+            <a:srgbClr val="A4A3A4"/>
+          </p15:clr>
+        </p15:guide>
+      </p15:sldGuideLst>
+    </p:ext>
+  </p:extLst>
 </p:presentation>
 </file>
 
@@ -3455,12 +3473,89 @@
           <a:chExt cx="0" cy="0"/>
         </a:xfrm>
       </p:grpSpPr>
+      <p:sp>
+        <p:nvSpPr>
+          <p:cNvPr id="2" name="Title 1">
+            <a:extLst>
+              <a:ext uri="{FF2B5EF4-FFF2-40B4-BE49-F238E27FC236}">
+                <a16:creationId xmlns:a16="http://schemas.microsoft.com/office/drawing/2014/main" id="{196769AB-B028-4A01-8A53-98EFFB9CBB76}"/>
+              </a:ext>
+            </a:extLst>
+          </p:cNvPr>
+          <p:cNvSpPr>
+            <a:spLocks noGrp="1"/>
+          </p:cNvSpPr>
+          <p:nvPr>
+            <p:ph type="title"/>
+          </p:nvPr>
+        </p:nvSpPr>
+        <p:spPr/>
+        <p:txBody>
+          <a:bodyPr/>
+          <a:lstStyle/>
+          <a:p>
+            <a:r>
+              <a:rPr lang="en-US" dirty="0"/>
+              <a:t>Observations during simulations</a:t>
+            </a:r>
+            <a:endParaRPr lang="da-DK" dirty="0"/>
+          </a:p>
+        </p:txBody>
+      </p:sp>
+      <p:sp>
+        <p:nvSpPr>
+          <p:cNvPr id="3" name="Content Placeholder 2">
+            <a:extLst>
+              <a:ext uri="{FF2B5EF4-FFF2-40B4-BE49-F238E27FC236}">
+                <a16:creationId xmlns:a16="http://schemas.microsoft.com/office/drawing/2014/main" id="{E7B4D7C7-6406-40E5-92BD-75B85F98BE21}"/>
+              </a:ext>
+            </a:extLst>
+          </p:cNvPr>
+          <p:cNvSpPr>
+            <a:spLocks noGrp="1"/>
+          </p:cNvSpPr>
+          <p:nvPr>
+            <p:ph idx="1"/>
+          </p:nvPr>
+        </p:nvSpPr>
+        <p:spPr>
+          <a:xfrm>
+            <a:off x="930296" y="3529435"/>
+            <a:ext cx="8397899" cy="2383168"/>
+          </a:xfrm>
+        </p:spPr>
+        <p:txBody>
+          <a:bodyPr/>
+          <a:lstStyle/>
+          <a:p>
+            <a:r>
+              <a:rPr lang="en-US" dirty="0"/>
+              <a:t>The next slides show in order the simulations for the </a:t>
+            </a:r>
+            <a:r>
+              <a:rPr lang="en-US" dirty="0" err="1"/>
+              <a:t>gascooler</a:t>
+            </a:r>
+            <a:r>
+              <a:rPr lang="en-US" dirty="0"/>
+              <a:t> (condenser): pressures (pascal), enthalpies (J/kg), densities (kg/m3), and sometimes mass flows (kg/s).</a:t>
+            </a:r>
+          </a:p>
+          <a:p>
+            <a:r>
+              <a:rPr lang="en-US" dirty="0"/>
+              <a:t>The figures show time evolution (unit: second)</a:t>
+            </a:r>
+            <a:endParaRPr lang="da-DK" dirty="0"/>
+          </a:p>
+        </p:txBody>
+      </p:sp>
       <p:pic>
         <p:nvPicPr>
-          <p:cNvPr id="9" name="Picture 8">
-            <a:extLst>
-              <a:ext uri="{FF2B5EF4-FFF2-40B4-BE49-F238E27FC236}">
-                <a16:creationId xmlns:a16="http://schemas.microsoft.com/office/drawing/2014/main" id="{E050A47A-E395-4635-BC26-3802641F4DEA}"/>
+          <p:cNvPr id="4" name="Picture 3">
+            <a:extLst>
+              <a:ext uri="{FF2B5EF4-FFF2-40B4-BE49-F238E27FC236}">
+                <a16:creationId xmlns:a16="http://schemas.microsoft.com/office/drawing/2014/main" id="{2A5CF485-6A95-4CE0-9174-B2C84880A171}"/>
               </a:ext>
             </a:extLst>
           </p:cNvPr>
@@ -3477,52 +3572,18 @@
         </p:blipFill>
         <p:spPr>
           <a:xfrm>
-            <a:off x="1355153" y="1026233"/>
-            <a:ext cx="9486963" cy="5611391"/>
+            <a:off x="710949" y="1445024"/>
+            <a:ext cx="10572750" cy="1704975"/>
           </a:xfrm>
           <a:prstGeom prst="rect">
             <a:avLst/>
           </a:prstGeom>
         </p:spPr>
       </p:pic>
-      <p:sp>
-        <p:nvSpPr>
-          <p:cNvPr id="11" name="Content Placeholder 2">
-            <a:extLst>
-              <a:ext uri="{FF2B5EF4-FFF2-40B4-BE49-F238E27FC236}">
-                <a16:creationId xmlns:a16="http://schemas.microsoft.com/office/drawing/2014/main" id="{A86E8B6D-B88D-44BE-80F9-4270AEFF9F33}"/>
-              </a:ext>
-            </a:extLst>
-          </p:cNvPr>
-          <p:cNvSpPr>
-            <a:spLocks noGrp="1"/>
-          </p:cNvSpPr>
-          <p:nvPr>
-            <p:ph idx="1"/>
-          </p:nvPr>
-        </p:nvSpPr>
-        <p:spPr>
-          <a:xfrm>
-            <a:off x="838198" y="450736"/>
-            <a:ext cx="9141261" cy="4351338"/>
-          </a:xfrm>
-        </p:spPr>
-        <p:txBody>
-          <a:bodyPr/>
-          <a:lstStyle/>
-          <a:p>
-            <a:r>
-              <a:rPr lang="en-US" dirty="0"/>
-              <a:t>10 cells, beginning of transient (very small pressure drops)</a:t>
-            </a:r>
-            <a:endParaRPr lang="da-DK" dirty="0"/>
-          </a:p>
-        </p:txBody>
-      </p:sp>
     </p:spTree>
     <p:extLst>
       <p:ext uri="{BB962C8B-B14F-4D97-AF65-F5344CB8AC3E}">
-        <p14:creationId xmlns:p14="http://schemas.microsoft.com/office/powerpoint/2010/main" val="1752385814"/>
+        <p14:creationId xmlns:p14="http://schemas.microsoft.com/office/powerpoint/2010/main" val="122546289"/>
       </p:ext>
     </p:extLst>
   </p:cSld>
@@ -3551,10 +3612,10 @@
       </p:grpSpPr>
       <p:pic>
         <p:nvPicPr>
-          <p:cNvPr id="4" name="Picture 3">
-            <a:extLst>
-              <a:ext uri="{FF2B5EF4-FFF2-40B4-BE49-F238E27FC236}">
-                <a16:creationId xmlns:a16="http://schemas.microsoft.com/office/drawing/2014/main" id="{834E1EB4-F899-4147-A2B4-834AC5EBFF53}"/>
+          <p:cNvPr id="9" name="Picture 8">
+            <a:extLst>
+              <a:ext uri="{FF2B5EF4-FFF2-40B4-BE49-F238E27FC236}">
+                <a16:creationId xmlns:a16="http://schemas.microsoft.com/office/drawing/2014/main" id="{E050A47A-E395-4635-BC26-3802641F4DEA}"/>
               </a:ext>
             </a:extLst>
           </p:cNvPr>
@@ -3571,8 +3632,8 @@
         </p:blipFill>
         <p:spPr>
           <a:xfrm>
-            <a:off x="1673517" y="1295891"/>
-            <a:ext cx="8844965" cy="5381202"/>
+            <a:off x="1355153" y="1026233"/>
+            <a:ext cx="9486963" cy="5611391"/>
           </a:xfrm>
           <a:prstGeom prst="rect">
             <a:avLst/>
@@ -3581,10 +3642,10 @@
       </p:pic>
       <p:sp>
         <p:nvSpPr>
-          <p:cNvPr id="5" name="Content Placeholder 2">
-            <a:extLst>
-              <a:ext uri="{FF2B5EF4-FFF2-40B4-BE49-F238E27FC236}">
-                <a16:creationId xmlns:a16="http://schemas.microsoft.com/office/drawing/2014/main" id="{EC968A9C-2273-45E4-8A71-B071EE124F4D}"/>
+          <p:cNvPr id="11" name="Content Placeholder 2">
+            <a:extLst>
+              <a:ext uri="{FF2B5EF4-FFF2-40B4-BE49-F238E27FC236}">
+                <a16:creationId xmlns:a16="http://schemas.microsoft.com/office/drawing/2014/main" id="{A86E8B6D-B88D-44BE-80F9-4270AEFF9F33}"/>
               </a:ext>
             </a:extLst>
           </p:cNvPr>
@@ -3597,26 +3658,145 @@
         </p:nvSpPr>
         <p:spPr>
           <a:xfrm>
-            <a:off x="838198" y="450736"/>
-            <a:ext cx="8397899" cy="4351338"/>
-          </a:xfrm>
-        </p:spPr>
-        <p:txBody>
-          <a:bodyPr/>
-          <a:lstStyle/>
-          <a:p>
-            <a:r>
-              <a:rPr lang="en-US" dirty="0"/>
-              <a:t>No resistance model, constant mass flow</a:t>
+            <a:off x="1006498" y="463893"/>
+            <a:ext cx="9141261" cy="4351338"/>
+          </a:xfrm>
+        </p:spPr>
+        <p:txBody>
+          <a:bodyPr/>
+          <a:lstStyle/>
+          <a:p>
+            <a:r>
+              <a:rPr lang="en-US" dirty="0"/>
+              <a:t>10 cells, beginning of transient (very small pressure drops)</a:t>
             </a:r>
             <a:endParaRPr lang="da-DK" dirty="0"/>
+          </a:p>
+        </p:txBody>
+      </p:sp>
+      <p:sp>
+        <p:nvSpPr>
+          <p:cNvPr id="2" name="TextBox 1">
+            <a:extLst>
+              <a:ext uri="{FF2B5EF4-FFF2-40B4-BE49-F238E27FC236}">
+                <a16:creationId xmlns:a16="http://schemas.microsoft.com/office/drawing/2014/main" id="{D243B8F1-A77C-4F41-B13E-8ECF3812390A}"/>
+              </a:ext>
+            </a:extLst>
+          </p:cNvPr>
+          <p:cNvSpPr txBox="1"/>
+          <p:nvPr/>
+        </p:nvSpPr>
+        <p:spPr>
+          <a:xfrm>
+            <a:off x="1006498" y="1881427"/>
+            <a:ext cx="306494" cy="369332"/>
+          </a:xfrm>
+          <a:prstGeom prst="rect">
+            <a:avLst/>
+          </a:prstGeom>
+          <a:noFill/>
+        </p:spPr>
+        <p:txBody>
+          <a:bodyPr wrap="none" rtlCol="0">
+            <a:spAutoFit/>
+          </a:bodyPr>
+          <a:lstStyle/>
+          <a:p>
+            <a:r>
+              <a:rPr lang="en-US" dirty="0"/>
+              <a:t>p</a:t>
+            </a:r>
+            <a:endParaRPr lang="da-DK" dirty="0"/>
+          </a:p>
+        </p:txBody>
+      </p:sp>
+      <p:sp>
+        <p:nvSpPr>
+          <p:cNvPr id="3" name="TextBox 2">
+            <a:extLst>
+              <a:ext uri="{FF2B5EF4-FFF2-40B4-BE49-F238E27FC236}">
+                <a16:creationId xmlns:a16="http://schemas.microsoft.com/office/drawing/2014/main" id="{53220636-695D-4B77-864F-AA935ADE296E}"/>
+              </a:ext>
+            </a:extLst>
+          </p:cNvPr>
+          <p:cNvSpPr txBox="1"/>
+          <p:nvPr/>
+        </p:nvSpPr>
+        <p:spPr>
+          <a:xfrm>
+            <a:off x="940714" y="3558924"/>
+            <a:ext cx="306494" cy="369332"/>
+          </a:xfrm>
+          <a:prstGeom prst="rect">
+            <a:avLst/>
+          </a:prstGeom>
+          <a:noFill/>
+        </p:spPr>
+        <p:txBody>
+          <a:bodyPr wrap="none" rtlCol="0">
+            <a:spAutoFit/>
+          </a:bodyPr>
+          <a:lstStyle/>
+          <a:p>
+            <a:r>
+              <a:rPr lang="en-US" dirty="0"/>
+              <a:t>h</a:t>
+            </a:r>
+            <a:endParaRPr lang="da-DK" dirty="0"/>
+          </a:p>
+        </p:txBody>
+      </p:sp>
+      <p:sp>
+        <p:nvSpPr>
+          <p:cNvPr id="4" name="TextBox 3">
+            <a:extLst>
+              <a:ext uri="{FF2B5EF4-FFF2-40B4-BE49-F238E27FC236}">
+                <a16:creationId xmlns:a16="http://schemas.microsoft.com/office/drawing/2014/main" id="{F20DA576-47B4-4867-8F9F-CE4B3728D67B}"/>
+              </a:ext>
+            </a:extLst>
+          </p:cNvPr>
+          <p:cNvSpPr txBox="1"/>
+          <p:nvPr/>
+        </p:nvSpPr>
+        <p:spPr>
+          <a:xfrm>
+            <a:off x="940714" y="5144322"/>
+            <a:ext cx="508473" cy="923330"/>
+          </a:xfrm>
+          <a:prstGeom prst="rect">
+            <a:avLst/>
+          </a:prstGeom>
+          <a:noFill/>
+        </p:spPr>
+        <p:txBody>
+          <a:bodyPr wrap="none" rtlCol="0">
+            <a:spAutoFit/>
+          </a:bodyPr>
+          <a:lstStyle/>
+          <a:p>
+            <a:r>
+              <a:rPr lang="en-US" dirty="0"/>
+              <a:t>d</a:t>
+            </a:r>
+          </a:p>
+          <a:p>
+            <a:r>
+              <a:rPr lang="en-US" dirty="0"/>
+              <a:t>or</a:t>
+            </a:r>
+          </a:p>
+          <a:p>
+            <a:r>
+              <a:rPr lang="en-US" dirty="0"/>
+              <a:t>rho</a:t>
+            </a:r>
           </a:p>
         </p:txBody>
       </p:sp>
     </p:spTree>
     <p:extLst>
       <p:ext uri="{BB962C8B-B14F-4D97-AF65-F5344CB8AC3E}">
-        <p14:creationId xmlns:p14="http://schemas.microsoft.com/office/powerpoint/2010/main" val="13962316"/>
+        <p14:creationId xmlns:p14="http://schemas.microsoft.com/office/powerpoint/2010/main" val="1752385814"/>
       </p:ext>
     </p:extLst>
   </p:cSld>
@@ -3648,7 +3828,7 @@
           <p:cNvPr id="4" name="Picture 3">
             <a:extLst>
               <a:ext uri="{FF2B5EF4-FFF2-40B4-BE49-F238E27FC236}">
-                <a16:creationId xmlns:a16="http://schemas.microsoft.com/office/drawing/2014/main" id="{B9496604-CA00-44C8-9B5E-453DD385253F}"/>
+                <a16:creationId xmlns:a16="http://schemas.microsoft.com/office/drawing/2014/main" id="{834E1EB4-F899-4147-A2B4-834AC5EBFF53}"/>
               </a:ext>
             </a:extLst>
           </p:cNvPr>
@@ -3665,8 +3845,8 @@
         </p:blipFill>
         <p:spPr>
           <a:xfrm>
-            <a:off x="1433616" y="1488393"/>
-            <a:ext cx="8532688" cy="5057131"/>
+            <a:off x="1673517" y="1295891"/>
+            <a:ext cx="8844965" cy="5381202"/>
           </a:xfrm>
           <a:prstGeom prst="rect">
             <a:avLst/>
@@ -3678,7 +3858,7 @@
           <p:cNvPr id="5" name="Content Placeholder 2">
             <a:extLst>
               <a:ext uri="{FF2B5EF4-FFF2-40B4-BE49-F238E27FC236}">
-                <a16:creationId xmlns:a16="http://schemas.microsoft.com/office/drawing/2014/main" id="{A1170474-B704-4F01-984F-7DB32C243CFB}"/>
+                <a16:creationId xmlns:a16="http://schemas.microsoft.com/office/drawing/2014/main" id="{EC968A9C-2273-45E4-8A71-B071EE124F4D}"/>
               </a:ext>
             </a:extLst>
           </p:cNvPr>
@@ -3701,22 +3881,135 @@
           <a:p>
             <a:r>
               <a:rPr lang="en-US" dirty="0"/>
-              <a:t>From now on resistances are considered again</a:t>
-            </a:r>
-          </a:p>
-          <a:p>
-            <a:r>
-              <a:rPr lang="en-US" dirty="0"/>
-              <a:t>Starting further from the steady state, 2 cells</a:t>
+              <a:t>No resistance model, constant mass flow</a:t>
             </a:r>
             <a:endParaRPr lang="da-DK" dirty="0"/>
+          </a:p>
+        </p:txBody>
+      </p:sp>
+      <p:sp>
+        <p:nvSpPr>
+          <p:cNvPr id="6" name="TextBox 5">
+            <a:extLst>
+              <a:ext uri="{FF2B5EF4-FFF2-40B4-BE49-F238E27FC236}">
+                <a16:creationId xmlns:a16="http://schemas.microsoft.com/office/drawing/2014/main" id="{F5136D7E-32EB-4E6F-8726-665F97726033}"/>
+              </a:ext>
+            </a:extLst>
+          </p:cNvPr>
+          <p:cNvSpPr txBox="1"/>
+          <p:nvPr/>
+        </p:nvSpPr>
+        <p:spPr>
+          <a:xfrm>
+            <a:off x="1006498" y="1881427"/>
+            <a:ext cx="306494" cy="369332"/>
+          </a:xfrm>
+          <a:prstGeom prst="rect">
+            <a:avLst/>
+          </a:prstGeom>
+          <a:noFill/>
+        </p:spPr>
+        <p:txBody>
+          <a:bodyPr wrap="none" rtlCol="0">
+            <a:spAutoFit/>
+          </a:bodyPr>
+          <a:lstStyle/>
+          <a:p>
+            <a:r>
+              <a:rPr lang="en-US" dirty="0"/>
+              <a:t>p</a:t>
+            </a:r>
+            <a:endParaRPr lang="da-DK" dirty="0"/>
+          </a:p>
+        </p:txBody>
+      </p:sp>
+      <p:sp>
+        <p:nvSpPr>
+          <p:cNvPr id="7" name="TextBox 6">
+            <a:extLst>
+              <a:ext uri="{FF2B5EF4-FFF2-40B4-BE49-F238E27FC236}">
+                <a16:creationId xmlns:a16="http://schemas.microsoft.com/office/drawing/2014/main" id="{F30A0D34-C17B-46CE-8563-718C7240E1E6}"/>
+              </a:ext>
+            </a:extLst>
+          </p:cNvPr>
+          <p:cNvSpPr txBox="1"/>
+          <p:nvPr/>
+        </p:nvSpPr>
+        <p:spPr>
+          <a:xfrm>
+            <a:off x="940714" y="3558924"/>
+            <a:ext cx="306494" cy="369332"/>
+          </a:xfrm>
+          <a:prstGeom prst="rect">
+            <a:avLst/>
+          </a:prstGeom>
+          <a:noFill/>
+        </p:spPr>
+        <p:txBody>
+          <a:bodyPr wrap="none" rtlCol="0">
+            <a:spAutoFit/>
+          </a:bodyPr>
+          <a:lstStyle/>
+          <a:p>
+            <a:r>
+              <a:rPr lang="en-US" dirty="0"/>
+              <a:t>h</a:t>
+            </a:r>
+            <a:endParaRPr lang="da-DK" dirty="0"/>
+          </a:p>
+        </p:txBody>
+      </p:sp>
+      <p:sp>
+        <p:nvSpPr>
+          <p:cNvPr id="8" name="TextBox 7">
+            <a:extLst>
+              <a:ext uri="{FF2B5EF4-FFF2-40B4-BE49-F238E27FC236}">
+                <a16:creationId xmlns:a16="http://schemas.microsoft.com/office/drawing/2014/main" id="{AB1F278A-C561-4FE1-9FD9-D4A76AC23280}"/>
+              </a:ext>
+            </a:extLst>
+          </p:cNvPr>
+          <p:cNvSpPr txBox="1"/>
+          <p:nvPr/>
+        </p:nvSpPr>
+        <p:spPr>
+          <a:xfrm>
+            <a:off x="940714" y="5144322"/>
+            <a:ext cx="508473" cy="923330"/>
+          </a:xfrm>
+          <a:prstGeom prst="rect">
+            <a:avLst/>
+          </a:prstGeom>
+          <a:noFill/>
+        </p:spPr>
+        <p:txBody>
+          <a:bodyPr wrap="none" rtlCol="0">
+            <a:spAutoFit/>
+          </a:bodyPr>
+          <a:lstStyle/>
+          <a:p>
+            <a:r>
+              <a:rPr lang="en-US" dirty="0"/>
+              <a:t>d</a:t>
+            </a:r>
+          </a:p>
+          <a:p>
+            <a:r>
+              <a:rPr lang="en-US" dirty="0"/>
+              <a:t>or</a:t>
+            </a:r>
+          </a:p>
+          <a:p>
+            <a:r>
+              <a:rPr lang="en-US" dirty="0"/>
+              <a:t>rho</a:t>
+            </a:r>
           </a:p>
         </p:txBody>
       </p:sp>
     </p:spTree>
     <p:extLst>
       <p:ext uri="{BB962C8B-B14F-4D97-AF65-F5344CB8AC3E}">
-        <p14:creationId xmlns:p14="http://schemas.microsoft.com/office/powerpoint/2010/main" val="4243723777"/>
+        <p14:creationId xmlns:p14="http://schemas.microsoft.com/office/powerpoint/2010/main" val="13962316"/>
       </p:ext>
     </p:extLst>
   </p:cSld>
@@ -3748,7 +4041,7 @@
           <p:cNvPr id="4" name="Picture 3">
             <a:extLst>
               <a:ext uri="{FF2B5EF4-FFF2-40B4-BE49-F238E27FC236}">
-                <a16:creationId xmlns:a16="http://schemas.microsoft.com/office/drawing/2014/main" id="{F78CD364-E99C-4100-8F86-51FD7861AADE}"/>
+                <a16:creationId xmlns:a16="http://schemas.microsoft.com/office/drawing/2014/main" id="{B9496604-CA00-44C8-9B5E-453DD385253F}"/>
               </a:ext>
             </a:extLst>
           </p:cNvPr>
@@ -3765,8 +4058,8 @@
         </p:blipFill>
         <p:spPr>
           <a:xfrm>
-            <a:off x="1341997" y="1115741"/>
-            <a:ext cx="9440030" cy="5602261"/>
+            <a:off x="1433616" y="1488393"/>
+            <a:ext cx="8532688" cy="5057131"/>
           </a:xfrm>
           <a:prstGeom prst="rect">
             <a:avLst/>
@@ -3778,7 +4071,7 @@
           <p:cNvPr id="5" name="Content Placeholder 2">
             <a:extLst>
               <a:ext uri="{FF2B5EF4-FFF2-40B4-BE49-F238E27FC236}">
-                <a16:creationId xmlns:a16="http://schemas.microsoft.com/office/drawing/2014/main" id="{87B97CB4-BCB4-4EE5-B598-3F2D9EAC9285}"/>
+                <a16:creationId xmlns:a16="http://schemas.microsoft.com/office/drawing/2014/main" id="{A1170474-B704-4F01-984F-7DB32C243CFB}"/>
               </a:ext>
             </a:extLst>
           </p:cNvPr>
@@ -3801,7 +4094,168 @@
           <a:p>
             <a:r>
               <a:rPr lang="en-US" dirty="0"/>
-              <a:t>Starting closer to the steady state (the simulation is much quicker)</a:t>
+              <a:t>From now on resistances are considered again</a:t>
+            </a:r>
+          </a:p>
+          <a:p>
+            <a:r>
+              <a:rPr lang="en-US" dirty="0"/>
+              <a:t>Starting further from the steady state, 2 cells</a:t>
+            </a:r>
+            <a:endParaRPr lang="da-DK" dirty="0"/>
+          </a:p>
+        </p:txBody>
+      </p:sp>
+      <p:sp>
+        <p:nvSpPr>
+          <p:cNvPr id="6" name="TextBox 5">
+            <a:extLst>
+              <a:ext uri="{FF2B5EF4-FFF2-40B4-BE49-F238E27FC236}">
+                <a16:creationId xmlns:a16="http://schemas.microsoft.com/office/drawing/2014/main" id="{ABF2F614-95BA-474E-B973-246F2C211EC4}"/>
+              </a:ext>
+            </a:extLst>
+          </p:cNvPr>
+          <p:cNvSpPr txBox="1"/>
+          <p:nvPr/>
+        </p:nvSpPr>
+        <p:spPr>
+          <a:xfrm>
+            <a:off x="1006498" y="1881427"/>
+            <a:ext cx="306494" cy="369332"/>
+          </a:xfrm>
+          <a:prstGeom prst="rect">
+            <a:avLst/>
+          </a:prstGeom>
+          <a:noFill/>
+        </p:spPr>
+        <p:txBody>
+          <a:bodyPr wrap="none" rtlCol="0">
+            <a:spAutoFit/>
+          </a:bodyPr>
+          <a:lstStyle/>
+          <a:p>
+            <a:r>
+              <a:rPr lang="en-US" dirty="0"/>
+              <a:t>p</a:t>
+            </a:r>
+            <a:endParaRPr lang="da-DK" dirty="0"/>
+          </a:p>
+        </p:txBody>
+      </p:sp>
+      <p:sp>
+        <p:nvSpPr>
+          <p:cNvPr id="7" name="TextBox 6">
+            <a:extLst>
+              <a:ext uri="{FF2B5EF4-FFF2-40B4-BE49-F238E27FC236}">
+                <a16:creationId xmlns:a16="http://schemas.microsoft.com/office/drawing/2014/main" id="{D436621C-2172-4E36-8AD5-ABD1A89A40F4}"/>
+              </a:ext>
+            </a:extLst>
+          </p:cNvPr>
+          <p:cNvSpPr txBox="1"/>
+          <p:nvPr/>
+        </p:nvSpPr>
+        <p:spPr>
+          <a:xfrm>
+            <a:off x="940714" y="3157084"/>
+            <a:ext cx="306494" cy="369332"/>
+          </a:xfrm>
+          <a:prstGeom prst="rect">
+            <a:avLst/>
+          </a:prstGeom>
+          <a:noFill/>
+        </p:spPr>
+        <p:txBody>
+          <a:bodyPr wrap="none" rtlCol="0">
+            <a:spAutoFit/>
+          </a:bodyPr>
+          <a:lstStyle/>
+          <a:p>
+            <a:r>
+              <a:rPr lang="en-US" dirty="0"/>
+              <a:t>h</a:t>
+            </a:r>
+            <a:endParaRPr lang="da-DK" dirty="0"/>
+          </a:p>
+        </p:txBody>
+      </p:sp>
+      <p:sp>
+        <p:nvSpPr>
+          <p:cNvPr id="8" name="TextBox 7">
+            <a:extLst>
+              <a:ext uri="{FF2B5EF4-FFF2-40B4-BE49-F238E27FC236}">
+                <a16:creationId xmlns:a16="http://schemas.microsoft.com/office/drawing/2014/main" id="{9DB2398C-0879-4D92-A0B5-F6FA7A971E96}"/>
+              </a:ext>
+            </a:extLst>
+          </p:cNvPr>
+          <p:cNvSpPr txBox="1"/>
+          <p:nvPr/>
+        </p:nvSpPr>
+        <p:spPr>
+          <a:xfrm>
+            <a:off x="925143" y="3702580"/>
+            <a:ext cx="508473" cy="923330"/>
+          </a:xfrm>
+          <a:prstGeom prst="rect">
+            <a:avLst/>
+          </a:prstGeom>
+          <a:noFill/>
+        </p:spPr>
+        <p:txBody>
+          <a:bodyPr wrap="none" rtlCol="0">
+            <a:spAutoFit/>
+          </a:bodyPr>
+          <a:lstStyle/>
+          <a:p>
+            <a:r>
+              <a:rPr lang="en-US" dirty="0"/>
+              <a:t>d</a:t>
+            </a:r>
+          </a:p>
+          <a:p>
+            <a:r>
+              <a:rPr lang="en-US" dirty="0"/>
+              <a:t>or</a:t>
+            </a:r>
+          </a:p>
+          <a:p>
+            <a:r>
+              <a:rPr lang="en-US" dirty="0"/>
+              <a:t>rho</a:t>
+            </a:r>
+          </a:p>
+        </p:txBody>
+      </p:sp>
+      <p:sp>
+        <p:nvSpPr>
+          <p:cNvPr id="2" name="TextBox 1">
+            <a:extLst>
+              <a:ext uri="{FF2B5EF4-FFF2-40B4-BE49-F238E27FC236}">
+                <a16:creationId xmlns:a16="http://schemas.microsoft.com/office/drawing/2014/main" id="{67537B6D-1A84-4547-8F5D-6074E55702FD}"/>
+              </a:ext>
+            </a:extLst>
+          </p:cNvPr>
+          <p:cNvSpPr txBox="1"/>
+          <p:nvPr/>
+        </p:nvSpPr>
+        <p:spPr>
+          <a:xfrm>
+            <a:off x="668203" y="5158652"/>
+            <a:ext cx="851515" cy="369332"/>
+          </a:xfrm>
+          <a:prstGeom prst="rect">
+            <a:avLst/>
+          </a:prstGeom>
+          <a:noFill/>
+        </p:spPr>
+        <p:txBody>
+          <a:bodyPr wrap="none" rtlCol="0">
+            <a:spAutoFit/>
+          </a:bodyPr>
+          <a:lstStyle/>
+          <a:p>
+            <a:r>
+              <a:rPr lang="en-US" dirty="0"/>
+              <a:t>Dot(m)</a:t>
             </a:r>
             <a:endParaRPr lang="da-DK" dirty="0"/>
           </a:p>
@@ -3810,7 +4264,7 @@
     </p:spTree>
     <p:extLst>
       <p:ext uri="{BB962C8B-B14F-4D97-AF65-F5344CB8AC3E}">
-        <p14:creationId xmlns:p14="http://schemas.microsoft.com/office/powerpoint/2010/main" val="153705962"/>
+        <p14:creationId xmlns:p14="http://schemas.microsoft.com/office/powerpoint/2010/main" val="4243723777"/>
       </p:ext>
     </p:extLst>
   </p:cSld>
@@ -3837,48 +4291,12 @@
           <a:chExt cx="0" cy="0"/>
         </a:xfrm>
       </p:grpSpPr>
-      <p:sp>
-        <p:nvSpPr>
-          <p:cNvPr id="3" name="Content Placeholder 2">
-            <a:extLst>
-              <a:ext uri="{FF2B5EF4-FFF2-40B4-BE49-F238E27FC236}">
-                <a16:creationId xmlns:a16="http://schemas.microsoft.com/office/drawing/2014/main" id="{AE8B8AE7-4E8B-4C90-8FE6-9599C9DBE8DD}"/>
-              </a:ext>
-            </a:extLst>
-          </p:cNvPr>
-          <p:cNvSpPr>
-            <a:spLocks noGrp="1"/>
-          </p:cNvSpPr>
-          <p:nvPr>
-            <p:ph idx="1"/>
-          </p:nvPr>
-        </p:nvSpPr>
-        <p:spPr>
-          <a:xfrm>
-            <a:off x="713210" y="404686"/>
-            <a:ext cx="10515600" cy="950467"/>
-          </a:xfrm>
-        </p:spPr>
-        <p:txBody>
-          <a:bodyPr>
-            <a:normAutofit fontScale="92500"/>
-          </a:bodyPr>
-          <a:lstStyle/>
-          <a:p>
-            <a:r>
-              <a:rPr lang="en-US" dirty="0"/>
-              <a:t>Controlled pressure, by adding outlet valve (timestep is 0.1 sec, discrete PI controller with same sampling and ZOH (zero order hold) time )</a:t>
-            </a:r>
-            <a:endParaRPr lang="da-DK" dirty="0"/>
-          </a:p>
-        </p:txBody>
-      </p:sp>
       <p:pic>
         <p:nvPicPr>
           <p:cNvPr id="4" name="Picture 3">
             <a:extLst>
               <a:ext uri="{FF2B5EF4-FFF2-40B4-BE49-F238E27FC236}">
-                <a16:creationId xmlns:a16="http://schemas.microsoft.com/office/drawing/2014/main" id="{DAECCA04-3314-4D60-BA9A-9C605553BB1F}"/>
+                <a16:creationId xmlns:a16="http://schemas.microsoft.com/office/drawing/2014/main" id="{F78CD364-E99C-4100-8F86-51FD7861AADE}"/>
               </a:ext>
             </a:extLst>
           </p:cNvPr>
@@ -3895,48 +4313,207 @@
         </p:blipFill>
         <p:spPr>
           <a:xfrm>
-            <a:off x="340947" y="1222694"/>
-            <a:ext cx="9047057" cy="5454399"/>
+            <a:off x="1341997" y="1115741"/>
+            <a:ext cx="9440030" cy="5602261"/>
           </a:xfrm>
           <a:prstGeom prst="rect">
             <a:avLst/>
           </a:prstGeom>
         </p:spPr>
       </p:pic>
-      <p:pic>
-        <p:nvPicPr>
-          <p:cNvPr id="5" name="Picture 4">
-            <a:extLst>
-              <a:ext uri="{FF2B5EF4-FFF2-40B4-BE49-F238E27FC236}">
-                <a16:creationId xmlns:a16="http://schemas.microsoft.com/office/drawing/2014/main" id="{B38D4B9C-7980-4294-9690-573BDBB94F90}"/>
-              </a:ext>
-            </a:extLst>
-          </p:cNvPr>
-          <p:cNvPicPr>
-            <a:picLocks noChangeAspect="1"/>
-          </p:cNvPicPr>
+      <p:sp>
+        <p:nvSpPr>
+          <p:cNvPr id="5" name="Content Placeholder 2">
+            <a:extLst>
+              <a:ext uri="{FF2B5EF4-FFF2-40B4-BE49-F238E27FC236}">
+                <a16:creationId xmlns:a16="http://schemas.microsoft.com/office/drawing/2014/main" id="{87B97CB4-BCB4-4EE5-B598-3F2D9EAC9285}"/>
+              </a:ext>
+            </a:extLst>
+          </p:cNvPr>
+          <p:cNvSpPr>
+            <a:spLocks noGrp="1"/>
+          </p:cNvSpPr>
+          <p:nvPr>
+            <p:ph idx="1"/>
+          </p:nvPr>
+        </p:nvSpPr>
+        <p:spPr>
+          <a:xfrm>
+            <a:off x="838198" y="450736"/>
+            <a:ext cx="8397899" cy="4351338"/>
+          </a:xfrm>
+        </p:spPr>
+        <p:txBody>
+          <a:bodyPr/>
+          <a:lstStyle/>
+          <a:p>
+            <a:r>
+              <a:rPr lang="en-US" dirty="0"/>
+              <a:t>Starting closer to the steady state (the simulation is much quicker)</a:t>
+            </a:r>
+            <a:endParaRPr lang="da-DK" dirty="0"/>
+          </a:p>
+        </p:txBody>
+      </p:sp>
+      <p:sp>
+        <p:nvSpPr>
+          <p:cNvPr id="6" name="TextBox 5">
+            <a:extLst>
+              <a:ext uri="{FF2B5EF4-FFF2-40B4-BE49-F238E27FC236}">
+                <a16:creationId xmlns:a16="http://schemas.microsoft.com/office/drawing/2014/main" id="{D5CF53CD-49EC-421E-8336-0956E755BEAB}"/>
+              </a:ext>
+            </a:extLst>
+          </p:cNvPr>
+          <p:cNvSpPr txBox="1"/>
           <p:nvPr/>
-        </p:nvPicPr>
-        <p:blipFill>
-          <a:blip r:embed="rId3"/>
-          <a:stretch>
-            <a:fillRect/>
-          </a:stretch>
-        </p:blipFill>
-        <p:spPr>
-          <a:xfrm>
-            <a:off x="4621955" y="3172854"/>
-            <a:ext cx="7337608" cy="1554078"/>
+        </p:nvSpPr>
+        <p:spPr>
+          <a:xfrm>
+            <a:off x="1006498" y="1881427"/>
+            <a:ext cx="306494" cy="369332"/>
           </a:xfrm>
           <a:prstGeom prst="rect">
             <a:avLst/>
           </a:prstGeom>
-        </p:spPr>
-      </p:pic>
+          <a:noFill/>
+        </p:spPr>
+        <p:txBody>
+          <a:bodyPr wrap="none" rtlCol="0">
+            <a:spAutoFit/>
+          </a:bodyPr>
+          <a:lstStyle/>
+          <a:p>
+            <a:r>
+              <a:rPr lang="en-US" dirty="0"/>
+              <a:t>p</a:t>
+            </a:r>
+            <a:endParaRPr lang="da-DK" dirty="0"/>
+          </a:p>
+        </p:txBody>
+      </p:sp>
+      <p:sp>
+        <p:nvSpPr>
+          <p:cNvPr id="7" name="TextBox 6">
+            <a:extLst>
+              <a:ext uri="{FF2B5EF4-FFF2-40B4-BE49-F238E27FC236}">
+                <a16:creationId xmlns:a16="http://schemas.microsoft.com/office/drawing/2014/main" id="{A3453CA6-6C23-4E2F-9AF0-26929AC88166}"/>
+              </a:ext>
+            </a:extLst>
+          </p:cNvPr>
+          <p:cNvSpPr txBox="1"/>
+          <p:nvPr/>
+        </p:nvSpPr>
+        <p:spPr>
+          <a:xfrm>
+            <a:off x="940714" y="3157084"/>
+            <a:ext cx="306494" cy="369332"/>
+          </a:xfrm>
+          <a:prstGeom prst="rect">
+            <a:avLst/>
+          </a:prstGeom>
+          <a:noFill/>
+        </p:spPr>
+        <p:txBody>
+          <a:bodyPr wrap="none" rtlCol="0">
+            <a:spAutoFit/>
+          </a:bodyPr>
+          <a:lstStyle/>
+          <a:p>
+            <a:r>
+              <a:rPr lang="en-US" dirty="0"/>
+              <a:t>h</a:t>
+            </a:r>
+            <a:endParaRPr lang="da-DK" dirty="0"/>
+          </a:p>
+        </p:txBody>
+      </p:sp>
+      <p:sp>
+        <p:nvSpPr>
+          <p:cNvPr id="8" name="TextBox 7">
+            <a:extLst>
+              <a:ext uri="{FF2B5EF4-FFF2-40B4-BE49-F238E27FC236}">
+                <a16:creationId xmlns:a16="http://schemas.microsoft.com/office/drawing/2014/main" id="{361DDE43-CD82-4609-95A2-86111F9A1843}"/>
+              </a:ext>
+            </a:extLst>
+          </p:cNvPr>
+          <p:cNvSpPr txBox="1"/>
+          <p:nvPr/>
+        </p:nvSpPr>
+        <p:spPr>
+          <a:xfrm>
+            <a:off x="925143" y="3702580"/>
+            <a:ext cx="508473" cy="923330"/>
+          </a:xfrm>
+          <a:prstGeom prst="rect">
+            <a:avLst/>
+          </a:prstGeom>
+          <a:noFill/>
+        </p:spPr>
+        <p:txBody>
+          <a:bodyPr wrap="none" rtlCol="0">
+            <a:spAutoFit/>
+          </a:bodyPr>
+          <a:lstStyle/>
+          <a:p>
+            <a:r>
+              <a:rPr lang="en-US" dirty="0"/>
+              <a:t>d</a:t>
+            </a:r>
+          </a:p>
+          <a:p>
+            <a:r>
+              <a:rPr lang="en-US" dirty="0"/>
+              <a:t>or</a:t>
+            </a:r>
+          </a:p>
+          <a:p>
+            <a:r>
+              <a:rPr lang="en-US" dirty="0"/>
+              <a:t>rho</a:t>
+            </a:r>
+          </a:p>
+        </p:txBody>
+      </p:sp>
+      <p:sp>
+        <p:nvSpPr>
+          <p:cNvPr id="9" name="TextBox 8">
+            <a:extLst>
+              <a:ext uri="{FF2B5EF4-FFF2-40B4-BE49-F238E27FC236}">
+                <a16:creationId xmlns:a16="http://schemas.microsoft.com/office/drawing/2014/main" id="{5407EC13-9735-4688-A9A5-7B56FF6F19E9}"/>
+              </a:ext>
+            </a:extLst>
+          </p:cNvPr>
+          <p:cNvSpPr txBox="1"/>
+          <p:nvPr/>
+        </p:nvSpPr>
+        <p:spPr>
+          <a:xfrm>
+            <a:off x="668203" y="5158652"/>
+            <a:ext cx="851515" cy="369332"/>
+          </a:xfrm>
+          <a:prstGeom prst="rect">
+            <a:avLst/>
+          </a:prstGeom>
+          <a:noFill/>
+        </p:spPr>
+        <p:txBody>
+          <a:bodyPr wrap="none" rtlCol="0">
+            <a:spAutoFit/>
+          </a:bodyPr>
+          <a:lstStyle/>
+          <a:p>
+            <a:r>
+              <a:rPr lang="en-US" dirty="0"/>
+              <a:t>Dot(m)</a:t>
+            </a:r>
+            <a:endParaRPr lang="da-DK" dirty="0"/>
+          </a:p>
+        </p:txBody>
+      </p:sp>
     </p:spTree>
     <p:extLst>
       <p:ext uri="{BB962C8B-B14F-4D97-AF65-F5344CB8AC3E}">
-        <p14:creationId xmlns:p14="http://schemas.microsoft.com/office/powerpoint/2010/main" val="3826438852"/>
+        <p14:creationId xmlns:p14="http://schemas.microsoft.com/office/powerpoint/2010/main" val="153705962"/>
       </p:ext>
     </p:extLst>
   </p:cSld>
@@ -3965,92 +4542,220 @@
       </p:grpSpPr>
       <p:sp>
         <p:nvSpPr>
-          <p:cNvPr id="2" name="Title 1">
-            <a:extLst>
-              <a:ext uri="{FF2B5EF4-FFF2-40B4-BE49-F238E27FC236}">
-                <a16:creationId xmlns:a16="http://schemas.microsoft.com/office/drawing/2014/main" id="{5EE2E710-07BF-4CA1-B7FE-5D33A0505E42}"/>
-              </a:ext>
-            </a:extLst>
-          </p:cNvPr>
-          <p:cNvSpPr>
-            <a:spLocks noGrp="1"/>
-          </p:cNvSpPr>
-          <p:nvPr>
-            <p:ph type="title"/>
-          </p:nvPr>
-        </p:nvSpPr>
-        <p:spPr/>
-        <p:txBody>
-          <a:bodyPr/>
-          <a:lstStyle/>
-          <a:p>
-            <a:r>
-              <a:rPr lang="en-US" dirty="0"/>
-              <a:t>Close future</a:t>
+          <p:cNvPr id="3" name="Content Placeholder 2">
+            <a:extLst>
+              <a:ext uri="{FF2B5EF4-FFF2-40B4-BE49-F238E27FC236}">
+                <a16:creationId xmlns:a16="http://schemas.microsoft.com/office/drawing/2014/main" id="{AE8B8AE7-4E8B-4C90-8FE6-9599C9DBE8DD}"/>
+              </a:ext>
+            </a:extLst>
+          </p:cNvPr>
+          <p:cNvSpPr>
+            <a:spLocks noGrp="1"/>
+          </p:cNvSpPr>
+          <p:nvPr>
+            <p:ph idx="1"/>
+          </p:nvPr>
+        </p:nvSpPr>
+        <p:spPr>
+          <a:xfrm>
+            <a:off x="713210" y="404686"/>
+            <a:ext cx="10515600" cy="950467"/>
+          </a:xfrm>
+        </p:spPr>
+        <p:txBody>
+          <a:bodyPr>
+            <a:normAutofit fontScale="92500"/>
+          </a:bodyPr>
+          <a:lstStyle/>
+          <a:p>
+            <a:r>
+              <a:rPr lang="en-US" dirty="0"/>
+              <a:t>Controlled pressure, by adding outlet valve (timestep is 0.1 sec, discrete PI controller with same sampling and ZOH (zero order hold) time )</a:t>
             </a:r>
             <a:endParaRPr lang="da-DK" dirty="0"/>
           </a:p>
         </p:txBody>
       </p:sp>
-      <p:sp>
-        <p:nvSpPr>
-          <p:cNvPr id="3" name="Content Placeholder 2">
-            <a:extLst>
-              <a:ext uri="{FF2B5EF4-FFF2-40B4-BE49-F238E27FC236}">
-                <a16:creationId xmlns:a16="http://schemas.microsoft.com/office/drawing/2014/main" id="{07FA1F18-AECD-453E-907C-5359DD777630}"/>
-              </a:ext>
-            </a:extLst>
-          </p:cNvPr>
-          <p:cNvSpPr>
-            <a:spLocks noGrp="1"/>
-          </p:cNvSpPr>
-          <p:nvPr>
-            <p:ph idx="1"/>
-          </p:nvPr>
-        </p:nvSpPr>
-        <p:spPr/>
-        <p:txBody>
-          <a:bodyPr/>
-          <a:lstStyle/>
-          <a:p>
-            <a:r>
-              <a:rPr lang="en-US" dirty="0"/>
-              <a:t>Simulating (solving) the system objects together (now they are frozen, until the others are calculated)</a:t>
-            </a:r>
-          </a:p>
-          <a:p>
-            <a:r>
-              <a:rPr lang="en-US" dirty="0"/>
-              <a:t>Giving time constant to actuator, and setting a rational sample time</a:t>
-            </a:r>
-          </a:p>
-          <a:p>
-            <a:r>
-              <a:rPr lang="en-US" dirty="0"/>
-              <a:t>Closing the loop</a:t>
-            </a:r>
-          </a:p>
-          <a:p>
-            <a:pPr lvl="1"/>
-            <a:r>
-              <a:rPr lang="en-US" dirty="0"/>
-              <a:t>Possible problem: loop of algebraic equations, which can be solved by </a:t>
-            </a:r>
-            <a:r>
-              <a:rPr lang="en-US" dirty="0" err="1"/>
-              <a:t>Dymola</a:t>
-            </a:r>
-            <a:r>
-              <a:rPr lang="en-US" dirty="0"/>
-              <a:t> DAE solvers, but not with the general </a:t>
-            </a:r>
-            <a:r>
-              <a:rPr lang="en-US" dirty="0" err="1"/>
-              <a:t>matlab</a:t>
-            </a:r>
-            <a:r>
-              <a:rPr lang="en-US" dirty="0"/>
-              <a:t> solvers</a:t>
+      <p:pic>
+        <p:nvPicPr>
+          <p:cNvPr id="4" name="Picture 3">
+            <a:extLst>
+              <a:ext uri="{FF2B5EF4-FFF2-40B4-BE49-F238E27FC236}">
+                <a16:creationId xmlns:a16="http://schemas.microsoft.com/office/drawing/2014/main" id="{DAECCA04-3314-4D60-BA9A-9C605553BB1F}"/>
+              </a:ext>
+            </a:extLst>
+          </p:cNvPr>
+          <p:cNvPicPr>
+            <a:picLocks noChangeAspect="1"/>
+          </p:cNvPicPr>
+          <p:nvPr/>
+        </p:nvPicPr>
+        <p:blipFill>
+          <a:blip r:embed="rId2"/>
+          <a:stretch>
+            <a:fillRect/>
+          </a:stretch>
+        </p:blipFill>
+        <p:spPr>
+          <a:xfrm>
+            <a:off x="1367180" y="1222694"/>
+            <a:ext cx="9047057" cy="5454399"/>
+          </a:xfrm>
+          <a:prstGeom prst="rect">
+            <a:avLst/>
+          </a:prstGeom>
+        </p:spPr>
+      </p:pic>
+      <p:sp>
+        <p:nvSpPr>
+          <p:cNvPr id="5" name="TextBox 4">
+            <a:extLst>
+              <a:ext uri="{FF2B5EF4-FFF2-40B4-BE49-F238E27FC236}">
+                <a16:creationId xmlns:a16="http://schemas.microsoft.com/office/drawing/2014/main" id="{964863A5-4F58-4432-869C-71CAE2D70FAE}"/>
+              </a:ext>
+            </a:extLst>
+          </p:cNvPr>
+          <p:cNvSpPr txBox="1"/>
+          <p:nvPr/>
+        </p:nvSpPr>
+        <p:spPr>
+          <a:xfrm>
+            <a:off x="1006498" y="1881427"/>
+            <a:ext cx="306494" cy="369332"/>
+          </a:xfrm>
+          <a:prstGeom prst="rect">
+            <a:avLst/>
+          </a:prstGeom>
+          <a:noFill/>
+        </p:spPr>
+        <p:txBody>
+          <a:bodyPr wrap="none" rtlCol="0">
+            <a:spAutoFit/>
+          </a:bodyPr>
+          <a:lstStyle/>
+          <a:p>
+            <a:r>
+              <a:rPr lang="en-US" dirty="0"/>
+              <a:t>p</a:t>
+            </a:r>
+            <a:endParaRPr lang="da-DK" dirty="0"/>
+          </a:p>
+        </p:txBody>
+      </p:sp>
+      <p:sp>
+        <p:nvSpPr>
+          <p:cNvPr id="6" name="TextBox 5">
+            <a:extLst>
+              <a:ext uri="{FF2B5EF4-FFF2-40B4-BE49-F238E27FC236}">
+                <a16:creationId xmlns:a16="http://schemas.microsoft.com/office/drawing/2014/main" id="{B31544A0-3DA7-41F7-BF1D-3A44CD9D6967}"/>
+              </a:ext>
+            </a:extLst>
+          </p:cNvPr>
+          <p:cNvSpPr txBox="1"/>
+          <p:nvPr/>
+        </p:nvSpPr>
+        <p:spPr>
+          <a:xfrm>
+            <a:off x="940714" y="3157084"/>
+            <a:ext cx="306494" cy="369332"/>
+          </a:xfrm>
+          <a:prstGeom prst="rect">
+            <a:avLst/>
+          </a:prstGeom>
+          <a:noFill/>
+        </p:spPr>
+        <p:txBody>
+          <a:bodyPr wrap="none" rtlCol="0">
+            <a:spAutoFit/>
+          </a:bodyPr>
+          <a:lstStyle/>
+          <a:p>
+            <a:r>
+              <a:rPr lang="en-US" dirty="0"/>
+              <a:t>h</a:t>
+            </a:r>
+            <a:endParaRPr lang="da-DK" dirty="0"/>
+          </a:p>
+        </p:txBody>
+      </p:sp>
+      <p:sp>
+        <p:nvSpPr>
+          <p:cNvPr id="7" name="TextBox 6">
+            <a:extLst>
+              <a:ext uri="{FF2B5EF4-FFF2-40B4-BE49-F238E27FC236}">
+                <a16:creationId xmlns:a16="http://schemas.microsoft.com/office/drawing/2014/main" id="{6F40FA93-1AC2-4D19-B2B2-34C10E48615D}"/>
+              </a:ext>
+            </a:extLst>
+          </p:cNvPr>
+          <p:cNvSpPr txBox="1"/>
+          <p:nvPr/>
+        </p:nvSpPr>
+        <p:spPr>
+          <a:xfrm>
+            <a:off x="925143" y="3702580"/>
+            <a:ext cx="508473" cy="923330"/>
+          </a:xfrm>
+          <a:prstGeom prst="rect">
+            <a:avLst/>
+          </a:prstGeom>
+          <a:noFill/>
+        </p:spPr>
+        <p:txBody>
+          <a:bodyPr wrap="none" rtlCol="0">
+            <a:spAutoFit/>
+          </a:bodyPr>
+          <a:lstStyle/>
+          <a:p>
+            <a:r>
+              <a:rPr lang="en-US" dirty="0"/>
+              <a:t>d</a:t>
+            </a:r>
+          </a:p>
+          <a:p>
+            <a:r>
+              <a:rPr lang="en-US" dirty="0"/>
+              <a:t>or</a:t>
+            </a:r>
+          </a:p>
+          <a:p>
+            <a:r>
+              <a:rPr lang="en-US" dirty="0"/>
+              <a:t>rho</a:t>
+            </a:r>
+          </a:p>
+        </p:txBody>
+      </p:sp>
+      <p:sp>
+        <p:nvSpPr>
+          <p:cNvPr id="8" name="TextBox 7">
+            <a:extLst>
+              <a:ext uri="{FF2B5EF4-FFF2-40B4-BE49-F238E27FC236}">
+                <a16:creationId xmlns:a16="http://schemas.microsoft.com/office/drawing/2014/main" id="{808BCE6E-48A0-481E-9D7B-52C79D9D0299}"/>
+              </a:ext>
+            </a:extLst>
+          </p:cNvPr>
+          <p:cNvSpPr txBox="1"/>
+          <p:nvPr/>
+        </p:nvSpPr>
+        <p:spPr>
+          <a:xfrm>
+            <a:off x="668203" y="5158652"/>
+            <a:ext cx="851515" cy="369332"/>
+          </a:xfrm>
+          <a:prstGeom prst="rect">
+            <a:avLst/>
+          </a:prstGeom>
+          <a:noFill/>
+        </p:spPr>
+        <p:txBody>
+          <a:bodyPr wrap="none" rtlCol="0">
+            <a:spAutoFit/>
+          </a:bodyPr>
+          <a:lstStyle/>
+          <a:p>
+            <a:r>
+              <a:rPr lang="en-US" dirty="0"/>
+              <a:t>Dot(m)</a:t>
             </a:r>
             <a:endParaRPr lang="da-DK" dirty="0"/>
           </a:p>
@@ -4059,7 +4764,7 @@
     </p:spTree>
     <p:extLst>
       <p:ext uri="{BB962C8B-B14F-4D97-AF65-F5344CB8AC3E}">
-        <p14:creationId xmlns:p14="http://schemas.microsoft.com/office/powerpoint/2010/main" val="1824596764"/>
+        <p14:creationId xmlns:p14="http://schemas.microsoft.com/office/powerpoint/2010/main" val="3826438852"/>
       </p:ext>
     </p:extLst>
   </p:cSld>
@@ -4086,11 +4791,415 @@
           <a:chExt cx="0" cy="0"/>
         </a:xfrm>
       </p:grpSpPr>
+      <p:pic>
+        <p:nvPicPr>
+          <p:cNvPr id="6" name="Picture 5">
+            <a:extLst>
+              <a:ext uri="{FF2B5EF4-FFF2-40B4-BE49-F238E27FC236}">
+                <a16:creationId xmlns:a16="http://schemas.microsoft.com/office/drawing/2014/main" id="{DAECCA04-3314-4D60-BA9A-9C605553BB1F}"/>
+              </a:ext>
+            </a:extLst>
+          </p:cNvPr>
+          <p:cNvPicPr>
+            <a:picLocks noChangeAspect="1"/>
+          </p:cNvPicPr>
+          <p:nvPr/>
+        </p:nvPicPr>
+        <p:blipFill>
+          <a:blip r:embed="rId2"/>
+          <a:stretch>
+            <a:fillRect/>
+          </a:stretch>
+        </p:blipFill>
+        <p:spPr>
+          <a:xfrm>
+            <a:off x="340947" y="1222694"/>
+            <a:ext cx="9047057" cy="5454399"/>
+          </a:xfrm>
+          <a:prstGeom prst="rect">
+            <a:avLst/>
+          </a:prstGeom>
+        </p:spPr>
+      </p:pic>
+      <p:sp>
+        <p:nvSpPr>
+          <p:cNvPr id="3" name="Content Placeholder 2">
+            <a:extLst>
+              <a:ext uri="{FF2B5EF4-FFF2-40B4-BE49-F238E27FC236}">
+                <a16:creationId xmlns:a16="http://schemas.microsoft.com/office/drawing/2014/main" id="{AE8B8AE7-4E8B-4C90-8FE6-9599C9DBE8DD}"/>
+              </a:ext>
+            </a:extLst>
+          </p:cNvPr>
+          <p:cNvSpPr>
+            <a:spLocks noGrp="1"/>
+          </p:cNvSpPr>
+          <p:nvPr>
+            <p:ph idx="1"/>
+          </p:nvPr>
+        </p:nvSpPr>
+        <p:spPr>
+          <a:xfrm>
+            <a:off x="713210" y="404686"/>
+            <a:ext cx="10515600" cy="950467"/>
+          </a:xfrm>
+        </p:spPr>
+        <p:txBody>
+          <a:bodyPr>
+            <a:normAutofit fontScale="92500"/>
+          </a:bodyPr>
+          <a:lstStyle/>
+          <a:p>
+            <a:r>
+              <a:rPr lang="en-US" dirty="0"/>
+              <a:t>Controlled pressure, by adding outlet valve (timestep is 0.1 sec, discrete PI controller with same sampling and ZOH (zero order hold) time )</a:t>
+            </a:r>
+            <a:endParaRPr lang="da-DK" dirty="0"/>
+          </a:p>
+        </p:txBody>
+      </p:sp>
+      <p:pic>
+        <p:nvPicPr>
+          <p:cNvPr id="5" name="Picture 4">
+            <a:extLst>
+              <a:ext uri="{FF2B5EF4-FFF2-40B4-BE49-F238E27FC236}">
+                <a16:creationId xmlns:a16="http://schemas.microsoft.com/office/drawing/2014/main" id="{B38D4B9C-7980-4294-9690-573BDBB94F90}"/>
+              </a:ext>
+            </a:extLst>
+          </p:cNvPr>
+          <p:cNvPicPr>
+            <a:picLocks noChangeAspect="1"/>
+          </p:cNvPicPr>
+          <p:nvPr/>
+        </p:nvPicPr>
+        <p:blipFill>
+          <a:blip r:embed="rId3"/>
+          <a:stretch>
+            <a:fillRect/>
+          </a:stretch>
+        </p:blipFill>
+        <p:spPr>
+          <a:xfrm>
+            <a:off x="708631" y="2579671"/>
+            <a:ext cx="10321513" cy="2186058"/>
+          </a:xfrm>
+          <a:prstGeom prst="rect">
+            <a:avLst/>
+          </a:prstGeom>
+        </p:spPr>
+      </p:pic>
+      <p:sp>
+        <p:nvSpPr>
+          <p:cNvPr id="7" name="TextBox 6">
+            <a:extLst>
+              <a:ext uri="{FF2B5EF4-FFF2-40B4-BE49-F238E27FC236}">
+                <a16:creationId xmlns:a16="http://schemas.microsoft.com/office/drawing/2014/main" id="{210C09F8-38ED-4200-9D3C-811D44F0E8F8}"/>
+              </a:ext>
+            </a:extLst>
+          </p:cNvPr>
+          <p:cNvSpPr txBox="1"/>
+          <p:nvPr/>
+        </p:nvSpPr>
+        <p:spPr>
+          <a:xfrm>
+            <a:off x="223663" y="1881427"/>
+            <a:ext cx="306494" cy="369332"/>
+          </a:xfrm>
+          <a:prstGeom prst="rect">
+            <a:avLst/>
+          </a:prstGeom>
+          <a:noFill/>
+        </p:spPr>
+        <p:txBody>
+          <a:bodyPr wrap="none" rtlCol="0">
+            <a:spAutoFit/>
+          </a:bodyPr>
+          <a:lstStyle/>
+          <a:p>
+            <a:r>
+              <a:rPr lang="en-US" dirty="0"/>
+              <a:t>p</a:t>
+            </a:r>
+            <a:endParaRPr lang="da-DK" dirty="0"/>
+          </a:p>
+        </p:txBody>
+      </p:sp>
+      <p:sp>
+        <p:nvSpPr>
+          <p:cNvPr id="8" name="TextBox 7">
+            <a:extLst>
+              <a:ext uri="{FF2B5EF4-FFF2-40B4-BE49-F238E27FC236}">
+                <a16:creationId xmlns:a16="http://schemas.microsoft.com/office/drawing/2014/main" id="{4B2BE07A-7DC5-44E5-A691-25F441B9D673}"/>
+              </a:ext>
+            </a:extLst>
+          </p:cNvPr>
+          <p:cNvSpPr txBox="1"/>
+          <p:nvPr/>
+        </p:nvSpPr>
+        <p:spPr>
+          <a:xfrm>
+            <a:off x="157879" y="3157084"/>
+            <a:ext cx="306494" cy="369332"/>
+          </a:xfrm>
+          <a:prstGeom prst="rect">
+            <a:avLst/>
+          </a:prstGeom>
+          <a:noFill/>
+        </p:spPr>
+        <p:txBody>
+          <a:bodyPr wrap="none" rtlCol="0">
+            <a:spAutoFit/>
+          </a:bodyPr>
+          <a:lstStyle/>
+          <a:p>
+            <a:r>
+              <a:rPr lang="en-US" dirty="0"/>
+              <a:t>h</a:t>
+            </a:r>
+            <a:endParaRPr lang="da-DK" dirty="0"/>
+          </a:p>
+        </p:txBody>
+      </p:sp>
+      <p:sp>
+        <p:nvSpPr>
+          <p:cNvPr id="9" name="TextBox 8">
+            <a:extLst>
+              <a:ext uri="{FF2B5EF4-FFF2-40B4-BE49-F238E27FC236}">
+                <a16:creationId xmlns:a16="http://schemas.microsoft.com/office/drawing/2014/main" id="{FB5872AC-85DA-44DC-88DC-385AEC425080}"/>
+              </a:ext>
+            </a:extLst>
+          </p:cNvPr>
+          <p:cNvSpPr txBox="1"/>
+          <p:nvPr/>
+        </p:nvSpPr>
+        <p:spPr>
+          <a:xfrm>
+            <a:off x="142308" y="3702580"/>
+            <a:ext cx="508473" cy="923330"/>
+          </a:xfrm>
+          <a:prstGeom prst="rect">
+            <a:avLst/>
+          </a:prstGeom>
+          <a:noFill/>
+        </p:spPr>
+        <p:txBody>
+          <a:bodyPr wrap="none" rtlCol="0">
+            <a:spAutoFit/>
+          </a:bodyPr>
+          <a:lstStyle/>
+          <a:p>
+            <a:r>
+              <a:rPr lang="en-US" dirty="0"/>
+              <a:t>d</a:t>
+            </a:r>
+          </a:p>
+          <a:p>
+            <a:r>
+              <a:rPr lang="en-US" dirty="0"/>
+              <a:t>or</a:t>
+            </a:r>
+          </a:p>
+          <a:p>
+            <a:r>
+              <a:rPr lang="en-US" dirty="0"/>
+              <a:t>rho</a:t>
+            </a:r>
+          </a:p>
+        </p:txBody>
+      </p:sp>
+      <p:sp>
+        <p:nvSpPr>
+          <p:cNvPr id="10" name="TextBox 9">
+            <a:extLst>
+              <a:ext uri="{FF2B5EF4-FFF2-40B4-BE49-F238E27FC236}">
+                <a16:creationId xmlns:a16="http://schemas.microsoft.com/office/drawing/2014/main" id="{266403ED-A838-47AD-9A27-C2EE5D7596A2}"/>
+              </a:ext>
+            </a:extLst>
+          </p:cNvPr>
+          <p:cNvSpPr txBox="1"/>
+          <p:nvPr/>
+        </p:nvSpPr>
+        <p:spPr>
+          <a:xfrm>
+            <a:off x="-114632" y="5158652"/>
+            <a:ext cx="851515" cy="369332"/>
+          </a:xfrm>
+          <a:prstGeom prst="rect">
+            <a:avLst/>
+          </a:prstGeom>
+          <a:noFill/>
+        </p:spPr>
+        <p:txBody>
+          <a:bodyPr wrap="none" rtlCol="0">
+            <a:spAutoFit/>
+          </a:bodyPr>
+          <a:lstStyle/>
+          <a:p>
+            <a:r>
+              <a:rPr lang="en-US" dirty="0"/>
+              <a:t>Dot(m)</a:t>
+            </a:r>
+            <a:endParaRPr lang="da-DK" dirty="0"/>
+          </a:p>
+        </p:txBody>
+      </p:sp>
+    </p:spTree>
+    <p:extLst>
+      <p:ext uri="{BB962C8B-B14F-4D97-AF65-F5344CB8AC3E}">
+        <p14:creationId xmlns:p14="http://schemas.microsoft.com/office/powerpoint/2010/main" val="3406698010"/>
+      </p:ext>
+    </p:extLst>
+  </p:cSld>
+  <p:clrMapOvr>
+    <a:masterClrMapping/>
+  </p:clrMapOvr>
+</p:sld>
+</file>
+
+<file path=ppt/slides/slide17.xml><?xml version="1.0" encoding="utf-8"?>
+<p:sld xmlns:a="http://schemas.openxmlformats.org/drawingml/2006/main" xmlns:r="http://schemas.openxmlformats.org/officeDocument/2006/relationships" xmlns:p="http://schemas.openxmlformats.org/presentationml/2006/main">
+  <p:cSld>
+    <p:spTree>
+      <p:nvGrpSpPr>
+        <p:cNvPr id="1" name=""/>
+        <p:cNvGrpSpPr/>
+        <p:nvPr/>
+      </p:nvGrpSpPr>
+      <p:grpSpPr>
+        <a:xfrm>
+          <a:off x="0" y="0"/>
+          <a:ext cx="0" cy="0"/>
+          <a:chOff x="0" y="0"/>
+          <a:chExt cx="0" cy="0"/>
+        </a:xfrm>
+      </p:grpSpPr>
       <p:sp>
         <p:nvSpPr>
           <p:cNvPr id="2" name="Title 1">
             <a:extLst>
               <a:ext uri="{FF2B5EF4-FFF2-40B4-BE49-F238E27FC236}">
+                <a16:creationId xmlns:a16="http://schemas.microsoft.com/office/drawing/2014/main" id="{5EE2E710-07BF-4CA1-B7FE-5D33A0505E42}"/>
+              </a:ext>
+            </a:extLst>
+          </p:cNvPr>
+          <p:cNvSpPr>
+            <a:spLocks noGrp="1"/>
+          </p:cNvSpPr>
+          <p:nvPr>
+            <p:ph type="title"/>
+          </p:nvPr>
+        </p:nvSpPr>
+        <p:spPr/>
+        <p:txBody>
+          <a:bodyPr/>
+          <a:lstStyle/>
+          <a:p>
+            <a:r>
+              <a:rPr lang="en-US" dirty="0"/>
+              <a:t>Close future</a:t>
+            </a:r>
+            <a:endParaRPr lang="da-DK" dirty="0"/>
+          </a:p>
+        </p:txBody>
+      </p:sp>
+      <p:sp>
+        <p:nvSpPr>
+          <p:cNvPr id="3" name="Content Placeholder 2">
+            <a:extLst>
+              <a:ext uri="{FF2B5EF4-FFF2-40B4-BE49-F238E27FC236}">
+                <a16:creationId xmlns:a16="http://schemas.microsoft.com/office/drawing/2014/main" id="{07FA1F18-AECD-453E-907C-5359DD777630}"/>
+              </a:ext>
+            </a:extLst>
+          </p:cNvPr>
+          <p:cNvSpPr>
+            <a:spLocks noGrp="1"/>
+          </p:cNvSpPr>
+          <p:nvPr>
+            <p:ph idx="1"/>
+          </p:nvPr>
+        </p:nvSpPr>
+        <p:spPr/>
+        <p:txBody>
+          <a:bodyPr/>
+          <a:lstStyle/>
+          <a:p>
+            <a:r>
+              <a:rPr lang="en-US" dirty="0"/>
+              <a:t>Simulating (solving) the system objects together (now they are frozen, until the others are calculated)</a:t>
+            </a:r>
+          </a:p>
+          <a:p>
+            <a:r>
+              <a:rPr lang="en-US" dirty="0"/>
+              <a:t>Giving time constant to actuator, and setting a rational sample time</a:t>
+            </a:r>
+          </a:p>
+          <a:p>
+            <a:r>
+              <a:rPr lang="en-US" dirty="0"/>
+              <a:t>Closing the loop</a:t>
+            </a:r>
+          </a:p>
+          <a:p>
+            <a:pPr lvl="1"/>
+            <a:r>
+              <a:rPr lang="en-US" dirty="0"/>
+              <a:t>Possible problem: loop of algebraic equations, which can be solved by </a:t>
+            </a:r>
+            <a:r>
+              <a:rPr lang="en-US" dirty="0" err="1"/>
+              <a:t>Dymola</a:t>
+            </a:r>
+            <a:r>
+              <a:rPr lang="en-US" dirty="0"/>
+              <a:t> DAE solvers, but not with the general </a:t>
+            </a:r>
+            <a:r>
+              <a:rPr lang="en-US" dirty="0" err="1"/>
+              <a:t>matlab</a:t>
+            </a:r>
+            <a:r>
+              <a:rPr lang="en-US" dirty="0"/>
+              <a:t> solvers</a:t>
+            </a:r>
+            <a:endParaRPr lang="da-DK" dirty="0"/>
+          </a:p>
+        </p:txBody>
+      </p:sp>
+    </p:spTree>
+    <p:extLst>
+      <p:ext uri="{BB962C8B-B14F-4D97-AF65-F5344CB8AC3E}">
+        <p14:creationId xmlns:p14="http://schemas.microsoft.com/office/powerpoint/2010/main" val="1824596764"/>
+      </p:ext>
+    </p:extLst>
+  </p:cSld>
+  <p:clrMapOvr>
+    <a:masterClrMapping/>
+  </p:clrMapOvr>
+</p:sld>
+</file>
+
+<file path=ppt/slides/slide18.xml><?xml version="1.0" encoding="utf-8"?>
+<p:sld xmlns:a="http://schemas.openxmlformats.org/drawingml/2006/main" xmlns:r="http://schemas.openxmlformats.org/officeDocument/2006/relationships" xmlns:p="http://schemas.openxmlformats.org/presentationml/2006/main">
+  <p:cSld>
+    <p:spTree>
+      <p:nvGrpSpPr>
+        <p:cNvPr id="1" name=""/>
+        <p:cNvGrpSpPr/>
+        <p:nvPr/>
+      </p:nvGrpSpPr>
+      <p:grpSpPr>
+        <a:xfrm>
+          <a:off x="0" y="0"/>
+          <a:ext cx="0" cy="0"/>
+          <a:chOff x="0" y="0"/>
+          <a:chExt cx="0" cy="0"/>
+        </a:xfrm>
+      </p:grpSpPr>
+      <p:sp>
+        <p:nvSpPr>
+          <p:cNvPr id="2" name="Title 1">
+            <a:extLst>
+              <a:ext uri="{FF2B5EF4-FFF2-40B4-BE49-F238E27FC236}">
                 <a16:creationId xmlns:a16="http://schemas.microsoft.com/office/drawing/2014/main" id="{98A4F41C-F656-402F-BFCB-241A7B240D6B}"/>
               </a:ext>
             </a:extLst>
@@ -4104,17 +5213,18 @@
         </p:nvSpPr>
         <p:spPr>
           <a:xfrm>
-            <a:off x="838200" y="2364964"/>
-            <a:ext cx="10515600" cy="1325563"/>
-          </a:xfrm>
-        </p:spPr>
-        <p:txBody>
-          <a:bodyPr/>
-          <a:lstStyle/>
-          <a:p>
-            <a:r>
-              <a:rPr lang="en-US" dirty="0"/>
-              <a:t>Thank you for the attention and see you on Monday!</a:t>
+            <a:off x="2583051" y="2364964"/>
+            <a:ext cx="7025898" cy="1325563"/>
+          </a:xfrm>
+        </p:spPr>
+        <p:txBody>
+          <a:bodyPr/>
+          <a:lstStyle/>
+          <a:p>
+            <a:pPr algn="ctr"/>
+            <a:r>
+              <a:rPr lang="en-US" dirty="0"/>
+              <a:t>Thank you for your time and see you on Monday!</a:t>
             </a:r>
             <a:endParaRPr lang="da-DK" dirty="0"/>
           </a:p>
@@ -4259,7 +5369,7 @@
           <p:cNvPr id="2" name="Title 1">
             <a:extLst>
               <a:ext uri="{FF2B5EF4-FFF2-40B4-BE49-F238E27FC236}">
-                <a16:creationId xmlns:a16="http://schemas.microsoft.com/office/drawing/2014/main" id="{66786E0F-1B98-4AA1-BD1A-81A774E734BA}"/>
+                <a16:creationId xmlns:a16="http://schemas.microsoft.com/office/drawing/2014/main" id="{DE47F3AB-4DBE-46C7-AE1C-657F60F1A7CE}"/>
               </a:ext>
             </a:extLst>
           </p:cNvPr>
@@ -4277,15 +5387,7 @@
           <a:p>
             <a:r>
               <a:rPr lang="en-US" dirty="0"/>
-              <a:t>Model: </a:t>
-            </a:r>
-            <a:r>
-              <a:rPr lang="en-US" dirty="0" err="1"/>
-              <a:t>Gascooler</a:t>
-            </a:r>
-            <a:r>
-              <a:rPr lang="en-US" dirty="0"/>
-              <a:t>, Receiver, Evaporators, Actuators</a:t>
+              <a:t>Notations</a:t>
             </a:r>
             <a:endParaRPr lang="da-DK" dirty="0"/>
           </a:p>
@@ -4296,7 +5398,7 @@
           <p:cNvPr id="3" name="Content Placeholder 2">
             <a:extLst>
               <a:ext uri="{FF2B5EF4-FFF2-40B4-BE49-F238E27FC236}">
-                <a16:creationId xmlns:a16="http://schemas.microsoft.com/office/drawing/2014/main" id="{C631C073-F37C-48D6-831B-7B0326306354}"/>
+                <a16:creationId xmlns:a16="http://schemas.microsoft.com/office/drawing/2014/main" id="{2371B0EB-18D8-4B67-A5FC-DB18DA7EBB95}"/>
               </a:ext>
             </a:extLst>
           </p:cNvPr>
@@ -4307,131 +5409,102 @@
             <p:ph idx="1"/>
           </p:nvPr>
         </p:nvSpPr>
-        <p:spPr>
-          <a:xfrm>
-            <a:off x="377712" y="1812468"/>
-            <a:ext cx="5194208" cy="4351338"/>
-          </a:xfrm>
-        </p:spPr>
+        <p:spPr/>
         <p:txBody>
           <a:bodyPr>
-            <a:normAutofit fontScale="85000" lnSpcReduction="20000"/>
+            <a:normAutofit fontScale="62500" lnSpcReduction="20000"/>
           </a:bodyPr>
           <a:lstStyle/>
           <a:p>
             <a:r>
               <a:rPr lang="en-US" dirty="0"/>
-              <a:t>Actuators: compressors, valves</a:t>
-            </a:r>
-          </a:p>
-          <a:p>
-            <a:r>
-              <a:rPr lang="en-US" dirty="0" err="1"/>
-              <a:t>Gascooler</a:t>
-            </a:r>
-            <a:r>
-              <a:rPr lang="en-US" dirty="0"/>
-              <a:t> (condenser): </a:t>
-            </a:r>
-            <a:r>
-              <a:rPr lang="en-US" dirty="0" err="1"/>
-              <a:t>detailful</a:t>
-            </a:r>
-            <a:r>
-              <a:rPr lang="en-US" dirty="0"/>
-              <a:t> model, currently heat flow is considered instead of temperature based heat transfer</a:t>
-            </a:r>
-          </a:p>
-          <a:p>
-            <a:r>
-              <a:rPr lang="en-US" dirty="0"/>
-              <a:t>Evaporators:</a:t>
-            </a:r>
-          </a:p>
-          <a:p>
-            <a:pPr lvl="1"/>
-            <a:r>
-              <a:rPr lang="en-US" dirty="0"/>
-              <a:t>Cooler and freezer</a:t>
-            </a:r>
-          </a:p>
-          <a:p>
-            <a:pPr lvl="1"/>
-            <a:r>
-              <a:rPr lang="en-US" dirty="0"/>
-              <a:t>Modelling with boundary conditions</a:t>
-            </a:r>
-          </a:p>
-          <a:p>
-            <a:r>
-              <a:rPr lang="en-US" dirty="0"/>
-              <a:t>Loop of algebraic equations:</a:t>
-            </a:r>
-          </a:p>
-          <a:p>
-            <a:pPr lvl="1"/>
-            <a:r>
-              <a:rPr lang="en-US" dirty="0"/>
-              <a:t>Gas loop for better heat transfer (at the middle valve)</a:t>
-            </a:r>
-          </a:p>
-          <a:p>
-            <a:r>
-              <a:rPr lang="en-US" dirty="0"/>
-              <a:t>1</a:t>
-            </a:r>
-            <a:r>
-              <a:rPr lang="da-DK" dirty="0"/>
-              <a:t> step version is in the figure</a:t>
-            </a:r>
-          </a:p>
-          <a:p>
-            <a:r>
-              <a:rPr lang="en-US" dirty="0"/>
-              <a:t>S</a:t>
-            </a:r>
-            <a:r>
-              <a:rPr lang="da-DK" dirty="0"/>
-              <a:t>upercritical operation considered</a:t>
-            </a:r>
+              <a:t>h – enthalpy</a:t>
+            </a:r>
+          </a:p>
+          <a:p>
+            <a:r>
+              <a:rPr lang="en-US" dirty="0"/>
+              <a:t>p – pressure</a:t>
+            </a:r>
+          </a:p>
+          <a:p>
+            <a:r>
+              <a:rPr lang="en-US" dirty="0"/>
+              <a:t>Q – heat flow</a:t>
+            </a:r>
+          </a:p>
+          <a:p>
+            <a:r>
+              <a:rPr lang="en-US" dirty="0"/>
+              <a:t>d or rho – density</a:t>
+            </a:r>
+          </a:p>
+          <a:p>
+            <a:r>
+              <a:rPr lang="en-US" dirty="0"/>
+              <a:t>T – temperature</a:t>
+            </a:r>
+          </a:p>
+          <a:p>
+            <a:r>
+              <a:rPr lang="en-US" dirty="0"/>
+              <a:t>Dot(m) – mass flow</a:t>
+            </a:r>
+          </a:p>
+          <a:p>
+            <a:r>
+              <a:rPr lang="en-US" dirty="0"/>
+              <a:t>V volume (constant)</a:t>
+            </a:r>
+          </a:p>
+          <a:p>
+            <a:r>
+              <a:rPr lang="en-US" dirty="0"/>
+              <a:t>Dot(V) – volume flow</a:t>
+            </a:r>
+          </a:p>
+          <a:p>
+            <a:r>
+              <a:rPr lang="en-US" dirty="0"/>
+              <a:t>M – mass (constant)</a:t>
+            </a:r>
+          </a:p>
+          <a:p>
+            <a:r>
+              <a:rPr lang="en-US" dirty="0"/>
+              <a:t>f_1 – friction coefficient</a:t>
+            </a:r>
+          </a:p>
+          <a:p>
+            <a:r>
+              <a:rPr lang="en-US" dirty="0"/>
+              <a:t>l – length of tube</a:t>
+            </a:r>
+          </a:p>
+          <a:p>
+            <a:r>
+              <a:rPr lang="en-US" dirty="0"/>
+              <a:t>d – inner diameter of tube (in the tube resistance equation)</a:t>
+            </a:r>
+          </a:p>
+          <a:p>
+            <a:r>
+              <a:rPr lang="en-US" dirty="0"/>
+              <a:t>Eta: efficiency</a:t>
+            </a:r>
+          </a:p>
+          <a:p>
             <a:endParaRPr lang="en-US" dirty="0"/>
           </a:p>
-        </p:txBody>
-      </p:sp>
-      <p:pic>
-        <p:nvPicPr>
-          <p:cNvPr id="4" name="Picture 3">
-            <a:extLst>
-              <a:ext uri="{FF2B5EF4-FFF2-40B4-BE49-F238E27FC236}">
-                <a16:creationId xmlns:a16="http://schemas.microsoft.com/office/drawing/2014/main" id="{41068134-D699-4DF6-8258-1A56E70362C3}"/>
-              </a:ext>
-            </a:extLst>
-          </p:cNvPr>
-          <p:cNvPicPr>
-            <a:picLocks noChangeAspect="1"/>
-          </p:cNvPicPr>
-          <p:nvPr/>
-        </p:nvPicPr>
-        <p:blipFill>
-          <a:blip r:embed="rId2"/>
-          <a:stretch>
-            <a:fillRect/>
-          </a:stretch>
-        </p:blipFill>
-        <p:spPr>
-          <a:xfrm>
-            <a:off x="5473243" y="3105013"/>
-            <a:ext cx="6269231" cy="3559583"/>
-          </a:xfrm>
-          <a:prstGeom prst="rect">
-            <a:avLst/>
-          </a:prstGeom>
-        </p:spPr>
-      </p:pic>
+          <a:p>
+            <a:endParaRPr lang="da-DK" dirty="0"/>
+          </a:p>
+        </p:txBody>
+      </p:sp>
     </p:spTree>
     <p:extLst>
       <p:ext uri="{BB962C8B-B14F-4D97-AF65-F5344CB8AC3E}">
-        <p14:creationId xmlns:p14="http://schemas.microsoft.com/office/powerpoint/2010/main" val="2493700092"/>
+        <p14:creationId xmlns:p14="http://schemas.microsoft.com/office/powerpoint/2010/main" val="3722984227"/>
       </p:ext>
     </p:extLst>
   </p:cSld>
@@ -4463,7 +5536,7 @@
           <p:cNvPr id="2" name="Title 1">
             <a:extLst>
               <a:ext uri="{FF2B5EF4-FFF2-40B4-BE49-F238E27FC236}">
-                <a16:creationId xmlns:a16="http://schemas.microsoft.com/office/drawing/2014/main" id="{1799F719-D05B-4C2A-A039-638F8316D9C2}"/>
+                <a16:creationId xmlns:a16="http://schemas.microsoft.com/office/drawing/2014/main" id="{66786E0F-1B98-4AA1-BD1A-81A774E734BA}"/>
               </a:ext>
             </a:extLst>
           </p:cNvPr>
@@ -4481,7 +5554,15 @@
           <a:p>
             <a:r>
               <a:rPr lang="en-US" dirty="0"/>
-              <a:t>The school project is the side project of an industry project</a:t>
+              <a:t>Model: </a:t>
+            </a:r>
+            <a:r>
+              <a:rPr lang="en-US" dirty="0" err="1"/>
+              <a:t>Gascooler</a:t>
+            </a:r>
+            <a:r>
+              <a:rPr lang="en-US" dirty="0"/>
+              <a:t>, Receiver, Evaporators, Actuators</a:t>
             </a:r>
             <a:endParaRPr lang="da-DK" dirty="0"/>
           </a:p>
@@ -4492,7 +5573,7 @@
           <p:cNvPr id="3" name="Content Placeholder 2">
             <a:extLst>
               <a:ext uri="{FF2B5EF4-FFF2-40B4-BE49-F238E27FC236}">
-                <a16:creationId xmlns:a16="http://schemas.microsoft.com/office/drawing/2014/main" id="{BAF6594B-0C2B-48C2-94F5-720B0B59FCA0}"/>
+                <a16:creationId xmlns:a16="http://schemas.microsoft.com/office/drawing/2014/main" id="{C631C073-F37C-48D6-831B-7B0326306354}"/>
               </a:ext>
             </a:extLst>
           </p:cNvPr>
@@ -4503,75 +5584,123 @@
             <p:ph idx="1"/>
           </p:nvPr>
         </p:nvSpPr>
-        <p:spPr/>
-        <p:txBody>
-          <a:bodyPr/>
-          <a:lstStyle/>
-          <a:p>
-            <a:r>
-              <a:rPr lang="en-US" dirty="0"/>
-              <a:t>Differences:</a:t>
+        <p:spPr>
+          <a:xfrm>
+            <a:off x="377711" y="1812468"/>
+            <a:ext cx="5426403" cy="4351338"/>
+          </a:xfrm>
+        </p:spPr>
+        <p:txBody>
+          <a:bodyPr>
+            <a:normAutofit fontScale="85000" lnSpcReduction="10000"/>
+          </a:bodyPr>
+          <a:lstStyle/>
+          <a:p>
+            <a:r>
+              <a:rPr lang="en-US" dirty="0"/>
+              <a:t>Actuators: compressors, valves</a:t>
+            </a:r>
+          </a:p>
+          <a:p>
+            <a:r>
+              <a:rPr lang="en-US" dirty="0" err="1"/>
+              <a:t>Gascooler</a:t>
+            </a:r>
+            <a:r>
+              <a:rPr lang="en-US" dirty="0"/>
+              <a:t> (condenser): detailed model, currently heat flow is considered instead of temperature-based heat transfer</a:t>
+            </a:r>
+          </a:p>
+          <a:p>
+            <a:r>
+              <a:rPr lang="en-US" dirty="0"/>
+              <a:t>Evaporators:</a:t>
             </a:r>
           </a:p>
           <a:p>
             <a:pPr lvl="1"/>
             <a:r>
               <a:rPr lang="en-US" dirty="0"/>
-              <a:t>Industry project: </a:t>
-            </a:r>
-            <a:r>
-              <a:rPr lang="en-US" dirty="0" err="1"/>
-              <a:t>Modelica</a:t>
-            </a:r>
-            <a:r>
-              <a:rPr lang="en-US" dirty="0"/>
-              <a:t>, school project: </a:t>
-            </a:r>
-            <a:r>
-              <a:rPr lang="en-US" dirty="0" err="1"/>
-              <a:t>Matlab</a:t>
+              <a:t>Cooler and freezer</a:t>
+            </a:r>
+          </a:p>
+          <a:p>
+            <a:pPr lvl="1"/>
+            <a:r>
+              <a:rPr lang="en-US" dirty="0"/>
+              <a:t>Modelling with boundary conditions</a:t>
+            </a:r>
+          </a:p>
+          <a:p>
+            <a:r>
+              <a:rPr lang="en-US" dirty="0"/>
+              <a:t>Loop of algebraic equations:</a:t>
+            </a:r>
+          </a:p>
+          <a:p>
+            <a:pPr lvl="1"/>
+            <a:r>
+              <a:rPr lang="en-US" dirty="0"/>
+              <a:t>Gas loop for better heat transfer (at the middle valve)</a:t>
+            </a:r>
+          </a:p>
+          <a:p>
+            <a:r>
+              <a:rPr lang="en-US" dirty="0"/>
+              <a:t>1</a:t>
+            </a:r>
+            <a:r>
+              <a:rPr lang="da-DK" dirty="0"/>
+              <a:t> step version is in the figure</a:t>
+            </a:r>
+          </a:p>
+          <a:p>
+            <a:r>
+              <a:rPr lang="en-US" dirty="0"/>
+              <a:t>S</a:t>
+            </a:r>
+            <a:r>
+              <a:rPr lang="da-DK" dirty="0"/>
+              <a:t>upercritical operation considered</a:t>
             </a:r>
             <a:endParaRPr lang="en-US" dirty="0"/>
           </a:p>
-          <a:p>
-            <a:pPr lvl="1"/>
-            <a:r>
-              <a:rPr lang="en-US" dirty="0" err="1"/>
-              <a:t>Matlab</a:t>
-            </a:r>
-            <a:r>
-              <a:rPr lang="en-US" dirty="0"/>
-              <a:t> solver: explicit, </a:t>
-            </a:r>
-            <a:r>
-              <a:rPr lang="en-US" dirty="0" err="1"/>
-              <a:t>Dymola</a:t>
-            </a:r>
-            <a:r>
-              <a:rPr lang="en-US" dirty="0"/>
-              <a:t> solver: implicit-explicit solvers, with DAE solvers</a:t>
-            </a:r>
-          </a:p>
-          <a:p>
-            <a:r>
-              <a:rPr lang="en-US" dirty="0"/>
-              <a:t>Similarities:</a:t>
-            </a:r>
-          </a:p>
-          <a:p>
-            <a:pPr lvl="1"/>
-            <a:r>
-              <a:rPr lang="en-US" dirty="0"/>
-              <a:t>Aim is to design a simulation that has enough fidelity to test controllers, and is quick</a:t>
-            </a:r>
-            <a:endParaRPr lang="da-DK" dirty="0"/>
-          </a:p>
-        </p:txBody>
-      </p:sp>
+        </p:txBody>
+      </p:sp>
+      <p:pic>
+        <p:nvPicPr>
+          <p:cNvPr id="4" name="Picture 3">
+            <a:extLst>
+              <a:ext uri="{FF2B5EF4-FFF2-40B4-BE49-F238E27FC236}">
+                <a16:creationId xmlns:a16="http://schemas.microsoft.com/office/drawing/2014/main" id="{41068134-D699-4DF6-8258-1A56E70362C3}"/>
+              </a:ext>
+            </a:extLst>
+          </p:cNvPr>
+          <p:cNvPicPr>
+            <a:picLocks noChangeAspect="1"/>
+          </p:cNvPicPr>
+          <p:nvPr/>
+        </p:nvPicPr>
+        <p:blipFill>
+          <a:blip r:embed="rId2"/>
+          <a:stretch>
+            <a:fillRect/>
+          </a:stretch>
+        </p:blipFill>
+        <p:spPr>
+          <a:xfrm>
+            <a:off x="5473243" y="3105013"/>
+            <a:ext cx="6269231" cy="3559583"/>
+          </a:xfrm>
+          <a:prstGeom prst="rect">
+            <a:avLst/>
+          </a:prstGeom>
+        </p:spPr>
+      </p:pic>
     </p:spTree>
     <p:extLst>
       <p:ext uri="{BB962C8B-B14F-4D97-AF65-F5344CB8AC3E}">
-        <p14:creationId xmlns:p14="http://schemas.microsoft.com/office/powerpoint/2010/main" val="2643900355"/>
+        <p14:creationId xmlns:p14="http://schemas.microsoft.com/office/powerpoint/2010/main" val="2493700092"/>
       </p:ext>
     </p:extLst>
   </p:cSld>
@@ -4603,7 +5732,7 @@
           <p:cNvPr id="2" name="Title 1">
             <a:extLst>
               <a:ext uri="{FF2B5EF4-FFF2-40B4-BE49-F238E27FC236}">
-                <a16:creationId xmlns:a16="http://schemas.microsoft.com/office/drawing/2014/main" id="{260C5CBA-6AB1-4673-9B16-BEE2BCBCBBBD}"/>
+                <a16:creationId xmlns:a16="http://schemas.microsoft.com/office/drawing/2014/main" id="{1799F719-D05B-4C2A-A039-638F8316D9C2}"/>
               </a:ext>
             </a:extLst>
           </p:cNvPr>
@@ -4621,76 +5750,97 @@
           <a:p>
             <a:r>
               <a:rPr lang="en-US" dirty="0"/>
-              <a:t>Confidential information</a:t>
+              <a:t>The course project is the side project of an industry project</a:t>
             </a:r>
             <a:endParaRPr lang="da-DK" dirty="0"/>
           </a:p>
         </p:txBody>
       </p:sp>
-      <p:pic>
-        <p:nvPicPr>
-          <p:cNvPr id="4" name="Picture 3">
-            <a:extLst>
-              <a:ext uri="{FF2B5EF4-FFF2-40B4-BE49-F238E27FC236}">
-                <a16:creationId xmlns:a16="http://schemas.microsoft.com/office/drawing/2014/main" id="{DE4B608E-438E-45D0-9557-66399279FAFF}"/>
-              </a:ext>
-            </a:extLst>
-          </p:cNvPr>
-          <p:cNvPicPr>
-            <a:picLocks noChangeAspect="1"/>
-          </p:cNvPicPr>
-          <p:nvPr/>
-        </p:nvPicPr>
-        <p:blipFill>
-          <a:blip r:embed="rId2"/>
-          <a:stretch>
-            <a:fillRect/>
-          </a:stretch>
-        </p:blipFill>
-        <p:spPr>
-          <a:xfrm>
-            <a:off x="7319691" y="78941"/>
-            <a:ext cx="4354700" cy="6858000"/>
-          </a:xfrm>
-          <a:prstGeom prst="rect">
-            <a:avLst/>
-          </a:prstGeom>
-        </p:spPr>
-      </p:pic>
-      <p:pic>
-        <p:nvPicPr>
-          <p:cNvPr id="6" name="Picture 5">
-            <a:extLst>
-              <a:ext uri="{FF2B5EF4-FFF2-40B4-BE49-F238E27FC236}">
-                <a16:creationId xmlns:a16="http://schemas.microsoft.com/office/drawing/2014/main" id="{FEC21F16-4245-40DB-97E2-E2B17113A752}"/>
-              </a:ext>
-            </a:extLst>
-          </p:cNvPr>
-          <p:cNvPicPr>
-            <a:picLocks noChangeAspect="1"/>
-          </p:cNvPicPr>
-          <p:nvPr/>
-        </p:nvPicPr>
-        <p:blipFill>
-          <a:blip r:embed="rId3"/>
-          <a:stretch>
-            <a:fillRect/>
-          </a:stretch>
-        </p:blipFill>
-        <p:spPr>
-          <a:xfrm>
-            <a:off x="1009246" y="1374924"/>
-            <a:ext cx="5409433" cy="5483076"/>
-          </a:xfrm>
-          <a:prstGeom prst="rect">
-            <a:avLst/>
-          </a:prstGeom>
-        </p:spPr>
-      </p:pic>
+      <p:sp>
+        <p:nvSpPr>
+          <p:cNvPr id="3" name="Content Placeholder 2">
+            <a:extLst>
+              <a:ext uri="{FF2B5EF4-FFF2-40B4-BE49-F238E27FC236}">
+                <a16:creationId xmlns:a16="http://schemas.microsoft.com/office/drawing/2014/main" id="{BAF6594B-0C2B-48C2-94F5-720B0B59FCA0}"/>
+              </a:ext>
+            </a:extLst>
+          </p:cNvPr>
+          <p:cNvSpPr>
+            <a:spLocks noGrp="1"/>
+          </p:cNvSpPr>
+          <p:nvPr>
+            <p:ph idx="1"/>
+          </p:nvPr>
+        </p:nvSpPr>
+        <p:spPr/>
+        <p:txBody>
+          <a:bodyPr/>
+          <a:lstStyle/>
+          <a:p>
+            <a:r>
+              <a:rPr lang="en-US" dirty="0"/>
+              <a:t>Differences:</a:t>
+            </a:r>
+          </a:p>
+          <a:p>
+            <a:pPr lvl="1"/>
+            <a:r>
+              <a:rPr lang="en-US" dirty="0"/>
+              <a:t>Industry project: </a:t>
+            </a:r>
+            <a:r>
+              <a:rPr lang="en-US" dirty="0" err="1"/>
+              <a:t>Modelica</a:t>
+            </a:r>
+            <a:r>
+              <a:rPr lang="en-US" dirty="0"/>
+              <a:t>, course project: </a:t>
+            </a:r>
+            <a:r>
+              <a:rPr lang="en-US" dirty="0" err="1"/>
+              <a:t>Matlab</a:t>
+            </a:r>
+            <a:endParaRPr lang="en-US" dirty="0"/>
+          </a:p>
+          <a:p>
+            <a:pPr lvl="1"/>
+            <a:r>
+              <a:rPr lang="en-US" dirty="0" err="1"/>
+              <a:t>Matlab</a:t>
+            </a:r>
+            <a:r>
+              <a:rPr lang="en-US" dirty="0"/>
+              <a:t> solver: explicit, </a:t>
+            </a:r>
+            <a:r>
+              <a:rPr lang="en-US" dirty="0" err="1"/>
+              <a:t>Dymola</a:t>
+            </a:r>
+            <a:r>
+              <a:rPr lang="en-US" dirty="0"/>
+              <a:t> solver: implicit-explicit solvers, with DAE solvers</a:t>
+            </a:r>
+          </a:p>
+          <a:p>
+            <a:r>
+              <a:rPr lang="en-US" dirty="0"/>
+              <a:t>Similarities:</a:t>
+            </a:r>
+          </a:p>
+          <a:p>
+            <a:pPr lvl="1"/>
+            <a:r>
+              <a:rPr lang="en-US" dirty="0"/>
+              <a:t>Aim is to design a simulation that has enough fidelity to test controllers, and is quick</a:t>
+            </a:r>
+            <a:endParaRPr lang="da-DK" dirty="0"/>
+          </a:p>
+        </p:txBody>
+      </p:sp>
     </p:spTree>
     <p:extLst>
       <p:ext uri="{BB962C8B-B14F-4D97-AF65-F5344CB8AC3E}">
-        <p14:creationId xmlns:p14="http://schemas.microsoft.com/office/powerpoint/2010/main" val="1330017171"/>
+        <p14:creationId xmlns:p14="http://schemas.microsoft.com/office/powerpoint/2010/main" val="2643900355"/>
       </p:ext>
     </p:extLst>
   </p:cSld>
@@ -4717,12 +5867,55 @@
           <a:chExt cx="0" cy="0"/>
         </a:xfrm>
       </p:grpSpPr>
+      <p:sp>
+        <p:nvSpPr>
+          <p:cNvPr id="2" name="Title 1">
+            <a:extLst>
+              <a:ext uri="{FF2B5EF4-FFF2-40B4-BE49-F238E27FC236}">
+                <a16:creationId xmlns:a16="http://schemas.microsoft.com/office/drawing/2014/main" id="{260C5CBA-6AB1-4673-9B16-BEE2BCBCBBBD}"/>
+              </a:ext>
+            </a:extLst>
+          </p:cNvPr>
+          <p:cNvSpPr>
+            <a:spLocks noGrp="1"/>
+          </p:cNvSpPr>
+          <p:nvPr>
+            <p:ph type="title"/>
+          </p:nvPr>
+        </p:nvSpPr>
+        <p:spPr>
+          <a:xfrm>
+            <a:off x="173780" y="361813"/>
+            <a:ext cx="7299302" cy="1032812"/>
+          </a:xfrm>
+        </p:spPr>
+        <p:txBody>
+          <a:bodyPr>
+            <a:normAutofit fontScale="90000"/>
+          </a:bodyPr>
+          <a:lstStyle/>
+          <a:p>
+            <a:r>
+              <a:rPr lang="en-US" dirty="0"/>
+              <a:t>Confidential information on this</a:t>
+            </a:r>
+            <a:br>
+              <a:rPr lang="en-US" dirty="0"/>
+            </a:br>
+            <a:r>
+              <a:rPr lang="en-US" dirty="0"/>
+              <a:t>slide (about long term perspective)</a:t>
+            </a:r>
+            <a:endParaRPr lang="da-DK" dirty="0"/>
+          </a:p>
+        </p:txBody>
+      </p:sp>
       <p:pic>
         <p:nvPicPr>
           <p:cNvPr id="4" name="Picture 3">
             <a:extLst>
               <a:ext uri="{FF2B5EF4-FFF2-40B4-BE49-F238E27FC236}">
-                <a16:creationId xmlns:a16="http://schemas.microsoft.com/office/drawing/2014/main" id="{CFAEBDA0-63E4-4AD9-9302-82F0AC4504E7}"/>
+                <a16:creationId xmlns:a16="http://schemas.microsoft.com/office/drawing/2014/main" id="{DE4B608E-438E-45D0-9557-66399279FAFF}"/>
               </a:ext>
             </a:extLst>
           </p:cNvPr>
@@ -4739,8 +5932,8 @@
         </p:blipFill>
         <p:spPr>
           <a:xfrm>
-            <a:off x="467136" y="382335"/>
-            <a:ext cx="10915650" cy="2238375"/>
+            <a:off x="7372318" y="78941"/>
+            <a:ext cx="4354700" cy="6858000"/>
           </a:xfrm>
           <a:prstGeom prst="rect">
             <a:avLst/>
@@ -4749,10 +5942,10 @@
       </p:pic>
       <p:pic>
         <p:nvPicPr>
-          <p:cNvPr id="5" name="Picture 4">
-            <a:extLst>
-              <a:ext uri="{FF2B5EF4-FFF2-40B4-BE49-F238E27FC236}">
-                <a16:creationId xmlns:a16="http://schemas.microsoft.com/office/drawing/2014/main" id="{D5AA00D1-52A7-4283-A6D2-1DCFBD680CF6}"/>
+          <p:cNvPr id="6" name="Picture 5">
+            <a:extLst>
+              <a:ext uri="{FF2B5EF4-FFF2-40B4-BE49-F238E27FC236}">
+                <a16:creationId xmlns:a16="http://schemas.microsoft.com/office/drawing/2014/main" id="{FEC21F16-4245-40DB-97E2-E2B17113A752}"/>
               </a:ext>
             </a:extLst>
           </p:cNvPr>
@@ -4769,66 +5962,18 @@
         </p:blipFill>
         <p:spPr>
           <a:xfrm>
-            <a:off x="8577981" y="3066638"/>
-            <a:ext cx="3228975" cy="2895600"/>
+            <a:off x="1009246" y="1743280"/>
+            <a:ext cx="5046023" cy="5114719"/>
           </a:xfrm>
           <a:prstGeom prst="rect">
             <a:avLst/>
           </a:prstGeom>
         </p:spPr>
       </p:pic>
-      <p:sp>
-        <p:nvSpPr>
-          <p:cNvPr id="6" name="Content Placeholder 2">
-            <a:extLst>
-              <a:ext uri="{FF2B5EF4-FFF2-40B4-BE49-F238E27FC236}">
-                <a16:creationId xmlns:a16="http://schemas.microsoft.com/office/drawing/2014/main" id="{9E692707-134F-4612-BE45-6B7D6C46BED0}"/>
-              </a:ext>
-            </a:extLst>
-          </p:cNvPr>
-          <p:cNvSpPr>
-            <a:spLocks noGrp="1"/>
-          </p:cNvSpPr>
-          <p:nvPr>
-            <p:ph idx="1"/>
-          </p:nvPr>
-        </p:nvSpPr>
-        <p:spPr>
-          <a:xfrm>
-            <a:off x="706631" y="3533706"/>
-            <a:ext cx="7713743" cy="4351338"/>
-          </a:xfrm>
-        </p:spPr>
-        <p:txBody>
-          <a:bodyPr/>
-          <a:lstStyle/>
-          <a:p>
-            <a:r>
-              <a:rPr lang="en-US" dirty="0"/>
-              <a:t>Compressor: discharge and suction sides with isentropic efficiency, mass flow and volumetric efficiency</a:t>
-            </a:r>
-          </a:p>
-          <a:p>
-            <a:r>
-              <a:rPr lang="en-US" dirty="0"/>
-              <a:t>Valve: valve coefficient, with constant </a:t>
-            </a:r>
-            <a:r>
-              <a:rPr lang="en-US" dirty="0" err="1"/>
-              <a:t>rho_water</a:t>
-            </a:r>
-            <a:r>
-              <a:rPr lang="en-US" dirty="0"/>
-              <a:t>, equal enthalpies </a:t>
-            </a:r>
-            <a:endParaRPr lang="da-DK" dirty="0"/>
-          </a:p>
-        </p:txBody>
-      </p:sp>
     </p:spTree>
     <p:extLst>
       <p:ext uri="{BB962C8B-B14F-4D97-AF65-F5344CB8AC3E}">
-        <p14:creationId xmlns:p14="http://schemas.microsoft.com/office/powerpoint/2010/main" val="3238999909"/>
+        <p14:creationId xmlns:p14="http://schemas.microsoft.com/office/powerpoint/2010/main" val="1330017171"/>
       </p:ext>
     </p:extLst>
   </p:cSld>
@@ -4855,66 +6000,12 @@
           <a:chExt cx="0" cy="0"/>
         </a:xfrm>
       </p:grpSpPr>
-      <p:sp>
-        <p:nvSpPr>
-          <p:cNvPr id="3" name="Content Placeholder 2">
-            <a:extLst>
-              <a:ext uri="{FF2B5EF4-FFF2-40B4-BE49-F238E27FC236}">
-                <a16:creationId xmlns:a16="http://schemas.microsoft.com/office/drawing/2014/main" id="{4EAF59E4-373E-4776-A466-9DAB333FDF2A}"/>
-              </a:ext>
-            </a:extLst>
-          </p:cNvPr>
-          <p:cNvSpPr>
-            <a:spLocks noGrp="1"/>
-          </p:cNvSpPr>
-          <p:nvPr>
-            <p:ph idx="1"/>
-          </p:nvPr>
-        </p:nvSpPr>
-        <p:spPr>
-          <a:xfrm>
-            <a:off x="786310" y="3088681"/>
-            <a:ext cx="5799422" cy="4351338"/>
-          </a:xfrm>
-        </p:spPr>
-        <p:txBody>
-          <a:bodyPr/>
-          <a:lstStyle/>
-          <a:p>
-            <a:r>
-              <a:rPr lang="en-US" dirty="0"/>
-              <a:t>Energy balance: constant volume has zero derivative, when differentiating inner enthalpy. Dot(Q) is heat flow. Dissipation energy is neglected.</a:t>
-            </a:r>
-          </a:p>
-          <a:p>
-            <a:r>
-              <a:rPr lang="en-US" dirty="0"/>
-              <a:t>Mass balance</a:t>
-            </a:r>
-          </a:p>
-          <a:p>
-            <a:r>
-              <a:rPr lang="en-US" dirty="0"/>
-              <a:t>Partial derivatives are provided by </a:t>
-            </a:r>
-            <a:r>
-              <a:rPr lang="en-US" dirty="0" err="1"/>
-              <a:t>CoolProp</a:t>
-            </a:r>
-            <a:r>
-              <a:rPr lang="en-US" dirty="0"/>
-              <a:t> library (this slows the simulation significantly)</a:t>
-            </a:r>
-            <a:endParaRPr lang="da-DK" dirty="0"/>
-          </a:p>
-        </p:txBody>
-      </p:sp>
       <p:pic>
         <p:nvPicPr>
-          <p:cNvPr id="5" name="Picture 4">
-            <a:extLst>
-              <a:ext uri="{FF2B5EF4-FFF2-40B4-BE49-F238E27FC236}">
-                <a16:creationId xmlns:a16="http://schemas.microsoft.com/office/drawing/2014/main" id="{1D6911E8-CDA1-488F-84E6-FD5A1C1C214C}"/>
+          <p:cNvPr id="4" name="Picture 3">
+            <a:extLst>
+              <a:ext uri="{FF2B5EF4-FFF2-40B4-BE49-F238E27FC236}">
+                <a16:creationId xmlns:a16="http://schemas.microsoft.com/office/drawing/2014/main" id="{CFAEBDA0-63E4-4AD9-9302-82F0AC4504E7}"/>
               </a:ext>
             </a:extLst>
           </p:cNvPr>
@@ -4931,8 +6022,8 @@
         </p:blipFill>
         <p:spPr>
           <a:xfrm>
-            <a:off x="586061" y="258237"/>
-            <a:ext cx="10911499" cy="2399444"/>
+            <a:off x="467136" y="382335"/>
+            <a:ext cx="10915650" cy="2238375"/>
           </a:xfrm>
           <a:prstGeom prst="rect">
             <a:avLst/>
@@ -4941,10 +6032,10 @@
       </p:pic>
       <p:pic>
         <p:nvPicPr>
-          <p:cNvPr id="6" name="Picture 5">
-            <a:extLst>
-              <a:ext uri="{FF2B5EF4-FFF2-40B4-BE49-F238E27FC236}">
-                <a16:creationId xmlns:a16="http://schemas.microsoft.com/office/drawing/2014/main" id="{2C031CAA-47A5-4862-8476-CFF67DEBB081}"/>
+          <p:cNvPr id="5" name="Picture 4">
+            <a:extLst>
+              <a:ext uri="{FF2B5EF4-FFF2-40B4-BE49-F238E27FC236}">
+                <a16:creationId xmlns:a16="http://schemas.microsoft.com/office/drawing/2014/main" id="{D5AA00D1-52A7-4283-A6D2-1DCFBD680CF6}"/>
               </a:ext>
             </a:extLst>
           </p:cNvPr>
@@ -4961,48 +6052,74 @@
         </p:blipFill>
         <p:spPr>
           <a:xfrm>
-            <a:off x="6785980" y="2657681"/>
-            <a:ext cx="4895850" cy="2171700"/>
+            <a:off x="8577981" y="3066638"/>
+            <a:ext cx="3228975" cy="2895600"/>
           </a:xfrm>
           <a:prstGeom prst="rect">
             <a:avLst/>
           </a:prstGeom>
         </p:spPr>
       </p:pic>
-      <p:pic>
-        <p:nvPicPr>
-          <p:cNvPr id="7" name="Picture 6">
-            <a:extLst>
-              <a:ext uri="{FF2B5EF4-FFF2-40B4-BE49-F238E27FC236}">
-                <a16:creationId xmlns:a16="http://schemas.microsoft.com/office/drawing/2014/main" id="{CD714B2D-31B7-4A67-A5AD-07FFF1F9B49D}"/>
-              </a:ext>
-            </a:extLst>
-          </p:cNvPr>
-          <p:cNvPicPr>
-            <a:picLocks noChangeAspect="1"/>
-          </p:cNvPicPr>
-          <p:nvPr/>
-        </p:nvPicPr>
-        <p:blipFill>
-          <a:blip r:embed="rId4"/>
-          <a:stretch>
-            <a:fillRect/>
-          </a:stretch>
-        </p:blipFill>
-        <p:spPr>
-          <a:xfrm>
-            <a:off x="6947905" y="5323481"/>
-            <a:ext cx="4733925" cy="1000125"/>
-          </a:xfrm>
-          <a:prstGeom prst="rect">
-            <a:avLst/>
-          </a:prstGeom>
-        </p:spPr>
-      </p:pic>
+      <p:sp>
+        <p:nvSpPr>
+          <p:cNvPr id="6" name="Content Placeholder 2">
+            <a:extLst>
+              <a:ext uri="{FF2B5EF4-FFF2-40B4-BE49-F238E27FC236}">
+                <a16:creationId xmlns:a16="http://schemas.microsoft.com/office/drawing/2014/main" id="{9E692707-134F-4612-BE45-6B7D6C46BED0}"/>
+              </a:ext>
+            </a:extLst>
+          </p:cNvPr>
+          <p:cNvSpPr>
+            <a:spLocks noGrp="1"/>
+          </p:cNvSpPr>
+          <p:nvPr>
+            <p:ph idx="1"/>
+          </p:nvPr>
+        </p:nvSpPr>
+        <p:spPr>
+          <a:xfrm>
+            <a:off x="706631" y="3533706"/>
+            <a:ext cx="7713743" cy="2495135"/>
+          </a:xfrm>
+        </p:spPr>
+        <p:txBody>
+          <a:bodyPr/>
+          <a:lstStyle/>
+          <a:p>
+            <a:r>
+              <a:rPr lang="en-US" u="sng" dirty="0"/>
+              <a:t>Compressor</a:t>
+            </a:r>
+            <a:r>
+              <a:rPr lang="en-US" dirty="0"/>
+              <a:t>: discharge and suction sides with isentropic efficiency, mass flow and volumetric efficiency</a:t>
+            </a:r>
+          </a:p>
+          <a:p>
+            <a:r>
+              <a:rPr lang="en-US" u="sng" dirty="0"/>
+              <a:t>Valve</a:t>
+            </a:r>
+            <a:r>
+              <a:rPr lang="en-US" dirty="0"/>
+              <a:t>: valve coefficient, with constant </a:t>
+            </a:r>
+            <a:r>
+              <a:rPr lang="en-US" dirty="0" err="1"/>
+              <a:t>rho_water</a:t>
+            </a:r>
+            <a:r>
+              <a:rPr lang="en-US" dirty="0"/>
+              <a:t>, equal enthalpies </a:t>
+            </a:r>
+            <a:endParaRPr lang="da-DK" dirty="0"/>
+          </a:p>
+        </p:txBody>
+      </p:sp>
     </p:spTree>
     <p:extLst>
       <p:ext uri="{BB962C8B-B14F-4D97-AF65-F5344CB8AC3E}">
-        <p14:creationId xmlns:p14="http://schemas.microsoft.com/office/powerpoint/2010/main" val="272941024"/>
+        <p14:creationId xmlns:p14="http://schemas.microsoft.com/office/powerpoint/2010/main" val="3238999909"/>
       </p:ext>
     </p:extLst>
   </p:cSld>
@@ -5034,7 +6151,7 @@
           <p:cNvPr id="3" name="Content Placeholder 2">
             <a:extLst>
               <a:ext uri="{FF2B5EF4-FFF2-40B4-BE49-F238E27FC236}">
-                <a16:creationId xmlns:a16="http://schemas.microsoft.com/office/drawing/2014/main" id="{0CC15641-E24B-4CE9-9BDD-3CD8D7FBB9F0}"/>
+                <a16:creationId xmlns:a16="http://schemas.microsoft.com/office/drawing/2014/main" id="{4EAF59E4-373E-4776-A466-9DAB333FDF2A}"/>
               </a:ext>
             </a:extLst>
           </p:cNvPr>
@@ -5047,17 +6164,41 @@
         </p:nvSpPr>
         <p:spPr>
           <a:xfrm>
-            <a:off x="1226018" y="3779415"/>
-            <a:ext cx="6227020" cy="4351338"/>
-          </a:xfrm>
-        </p:spPr>
-        <p:txBody>
-          <a:bodyPr/>
-          <a:lstStyle/>
-          <a:p>
-            <a:r>
-              <a:rPr lang="en-US" dirty="0"/>
-              <a:t>Tube resistance creates a mutual dependency between pressure and density</a:t>
+            <a:off x="786310" y="3088681"/>
+            <a:ext cx="5799422" cy="3498099"/>
+          </a:xfrm>
+        </p:spPr>
+        <p:txBody>
+          <a:bodyPr/>
+          <a:lstStyle/>
+          <a:p>
+            <a:r>
+              <a:rPr lang="en-US" u="sng" dirty="0"/>
+              <a:t>Energy balance</a:t>
+            </a:r>
+            <a:r>
+              <a:rPr lang="en-US" dirty="0"/>
+              <a:t>: constant volume has zero derivative, when differentiating inner enthalpy. Dot(Q) is heat flow. Dissipation energy is neglected.</a:t>
+            </a:r>
+          </a:p>
+          <a:p>
+            <a:r>
+              <a:rPr lang="en-US" dirty="0"/>
+              <a:t>Mass balance</a:t>
+            </a:r>
+          </a:p>
+          <a:p>
+            <a:r>
+              <a:rPr lang="en-US" dirty="0"/>
+              <a:t>Partial derivatives are provided by </a:t>
+            </a:r>
+            <a:r>
+              <a:rPr lang="en-US" dirty="0" err="1"/>
+              <a:t>CoolProp</a:t>
+            </a:r>
+            <a:r>
+              <a:rPr lang="en-US" dirty="0"/>
+              <a:t> library (this slows the simulation significantly)</a:t>
             </a:r>
             <a:endParaRPr lang="da-DK" dirty="0"/>
           </a:p>
@@ -5065,10 +6206,10 @@
       </p:sp>
       <p:pic>
         <p:nvPicPr>
-          <p:cNvPr id="4" name="Picture 3">
-            <a:extLst>
-              <a:ext uri="{FF2B5EF4-FFF2-40B4-BE49-F238E27FC236}">
-                <a16:creationId xmlns:a16="http://schemas.microsoft.com/office/drawing/2014/main" id="{10409DB2-4D5F-4AA7-88E4-720B9E25D412}"/>
+          <p:cNvPr id="5" name="Picture 4">
+            <a:extLst>
+              <a:ext uri="{FF2B5EF4-FFF2-40B4-BE49-F238E27FC236}">
+                <a16:creationId xmlns:a16="http://schemas.microsoft.com/office/drawing/2014/main" id="{1D6911E8-CDA1-488F-84E6-FD5A1C1C214C}"/>
               </a:ext>
             </a:extLst>
           </p:cNvPr>
@@ -5085,8 +6226,8 @@
         </p:blipFill>
         <p:spPr>
           <a:xfrm>
-            <a:off x="735892" y="813496"/>
-            <a:ext cx="10496550" cy="1704975"/>
+            <a:off x="586061" y="258237"/>
+            <a:ext cx="10911499" cy="2399444"/>
           </a:xfrm>
           <a:prstGeom prst="rect">
             <a:avLst/>
@@ -5098,7 +6239,7 @@
           <p:cNvPr id="6" name="Picture 5">
             <a:extLst>
               <a:ext uri="{FF2B5EF4-FFF2-40B4-BE49-F238E27FC236}">
-                <a16:creationId xmlns:a16="http://schemas.microsoft.com/office/drawing/2014/main" id="{16F6874E-7152-48E9-8460-978FBF86E087}"/>
+                <a16:creationId xmlns:a16="http://schemas.microsoft.com/office/drawing/2014/main" id="{2C031CAA-47A5-4862-8476-CFF67DEBB081}"/>
               </a:ext>
             </a:extLst>
           </p:cNvPr>
@@ -5115,8 +6256,74 @@
         </p:blipFill>
         <p:spPr>
           <a:xfrm>
-            <a:off x="7453038" y="3534255"/>
-            <a:ext cx="3169998" cy="1225059"/>
+            <a:off x="6785980" y="2657681"/>
+            <a:ext cx="4895850" cy="2171700"/>
+          </a:xfrm>
+          <a:prstGeom prst="rect">
+            <a:avLst/>
+          </a:prstGeom>
+        </p:spPr>
+      </p:pic>
+      <p:sp>
+        <p:nvSpPr>
+          <p:cNvPr id="2" name="TextBox 1">
+            <a:extLst>
+              <a:ext uri="{FF2B5EF4-FFF2-40B4-BE49-F238E27FC236}">
+                <a16:creationId xmlns:a16="http://schemas.microsoft.com/office/drawing/2014/main" id="{AA616B0F-BC9D-47C7-9D37-3146F1760617}"/>
+              </a:ext>
+            </a:extLst>
+          </p:cNvPr>
+          <p:cNvSpPr txBox="1"/>
+          <p:nvPr/>
+        </p:nvSpPr>
+        <p:spPr>
+          <a:xfrm>
+            <a:off x="6854711" y="5374567"/>
+            <a:ext cx="4310924" cy="369332"/>
+          </a:xfrm>
+          <a:prstGeom prst="rect">
+            <a:avLst/>
+          </a:prstGeom>
+          <a:noFill/>
+        </p:spPr>
+        <p:txBody>
+          <a:bodyPr wrap="none" rtlCol="0">
+            <a:spAutoFit/>
+          </a:bodyPr>
+          <a:lstStyle/>
+          <a:p>
+            <a:r>
+              <a:rPr lang="en-US" dirty="0"/>
+              <a:t>From the first and the third equation we get</a:t>
+            </a:r>
+            <a:endParaRPr lang="da-DK" dirty="0"/>
+          </a:p>
+        </p:txBody>
+      </p:sp>
+      <p:pic>
+        <p:nvPicPr>
+          <p:cNvPr id="9" name="Picture 8">
+            <a:extLst>
+              <a:ext uri="{FF2B5EF4-FFF2-40B4-BE49-F238E27FC236}">
+                <a16:creationId xmlns:a16="http://schemas.microsoft.com/office/drawing/2014/main" id="{BE38C3DB-B939-4EBB-9FBB-35719810DB0C}"/>
+              </a:ext>
+            </a:extLst>
+          </p:cNvPr>
+          <p:cNvPicPr>
+            <a:picLocks noChangeAspect="1"/>
+          </p:cNvPicPr>
+          <p:nvPr/>
+        </p:nvPicPr>
+        <p:blipFill>
+          <a:blip r:embed="rId4"/>
+          <a:stretch>
+            <a:fillRect/>
+          </a:stretch>
+        </p:blipFill>
+        <p:spPr>
+          <a:xfrm>
+            <a:off x="7028867" y="5793785"/>
+            <a:ext cx="4410075" cy="990600"/>
           </a:xfrm>
           <a:prstGeom prst="rect">
             <a:avLst/>
@@ -5126,7 +6333,7 @@
     </p:spTree>
     <p:extLst>
       <p:ext uri="{BB962C8B-B14F-4D97-AF65-F5344CB8AC3E}">
-        <p14:creationId xmlns:p14="http://schemas.microsoft.com/office/powerpoint/2010/main" val="2141633163"/>
+        <p14:creationId xmlns:p14="http://schemas.microsoft.com/office/powerpoint/2010/main" val="272941024"/>
       </p:ext>
     </p:extLst>
   </p:cSld>
@@ -5155,39 +6362,10 @@
       </p:grpSpPr>
       <p:sp>
         <p:nvSpPr>
-          <p:cNvPr id="2" name="Title 1">
-            <a:extLst>
-              <a:ext uri="{FF2B5EF4-FFF2-40B4-BE49-F238E27FC236}">
-                <a16:creationId xmlns:a16="http://schemas.microsoft.com/office/drawing/2014/main" id="{196769AB-B028-4A01-8A53-98EFFB9CBB76}"/>
-              </a:ext>
-            </a:extLst>
-          </p:cNvPr>
-          <p:cNvSpPr>
-            <a:spLocks noGrp="1"/>
-          </p:cNvSpPr>
-          <p:nvPr>
-            <p:ph type="title"/>
-          </p:nvPr>
-        </p:nvSpPr>
-        <p:spPr/>
-        <p:txBody>
-          <a:bodyPr/>
-          <a:lstStyle/>
-          <a:p>
-            <a:r>
-              <a:rPr lang="en-US" dirty="0"/>
-              <a:t>Observations during simulations</a:t>
-            </a:r>
-            <a:endParaRPr lang="da-DK" dirty="0"/>
-          </a:p>
-        </p:txBody>
-      </p:sp>
-      <p:sp>
-        <p:nvSpPr>
           <p:cNvPr id="3" name="Content Placeholder 2">
             <a:extLst>
               <a:ext uri="{FF2B5EF4-FFF2-40B4-BE49-F238E27FC236}">
-                <a16:creationId xmlns:a16="http://schemas.microsoft.com/office/drawing/2014/main" id="{E7B4D7C7-6406-40E5-92BD-75B85F98BE21}"/>
+                <a16:creationId xmlns:a16="http://schemas.microsoft.com/office/drawing/2014/main" id="{0CC15641-E24B-4CE9-9BDD-3CD8D7FBB9F0}"/>
               </a:ext>
             </a:extLst>
           </p:cNvPr>
@@ -5200,25 +6378,17 @@
         </p:nvSpPr>
         <p:spPr>
           <a:xfrm>
-            <a:off x="930296" y="3529435"/>
-            <a:ext cx="8397899" cy="4351338"/>
-          </a:xfrm>
-        </p:spPr>
-        <p:txBody>
-          <a:bodyPr/>
-          <a:lstStyle/>
-          <a:p>
-            <a:r>
-              <a:rPr lang="en-US" dirty="0"/>
-              <a:t>The next slides show in order the simulations for the </a:t>
-            </a:r>
-            <a:r>
-              <a:rPr lang="en-US" dirty="0" err="1"/>
-              <a:t>gascooler</a:t>
-            </a:r>
-            <a:r>
-              <a:rPr lang="en-US" dirty="0"/>
-              <a:t> (condenser): pressures , enthalpies, densities, and sometimes mass flows</a:t>
+            <a:off x="1226018" y="3779415"/>
+            <a:ext cx="6227020" cy="2466402"/>
+          </a:xfrm>
+        </p:spPr>
+        <p:txBody>
+          <a:bodyPr/>
+          <a:lstStyle/>
+          <a:p>
+            <a:r>
+              <a:rPr lang="en-US" dirty="0"/>
+              <a:t>Tube resistance creates a mutual dependency between pressure and density</a:t>
             </a:r>
             <a:endParaRPr lang="da-DK" dirty="0"/>
           </a:p>
@@ -5229,7 +6399,7 @@
           <p:cNvPr id="4" name="Picture 3">
             <a:extLst>
               <a:ext uri="{FF2B5EF4-FFF2-40B4-BE49-F238E27FC236}">
-                <a16:creationId xmlns:a16="http://schemas.microsoft.com/office/drawing/2014/main" id="{2A5CF485-6A95-4CE0-9174-B2C84880A171}"/>
+                <a16:creationId xmlns:a16="http://schemas.microsoft.com/office/drawing/2014/main" id="{10409DB2-4D5F-4AA7-88E4-720B9E25D412}"/>
               </a:ext>
             </a:extLst>
           </p:cNvPr>
@@ -5246,8 +6416,38 @@
         </p:blipFill>
         <p:spPr>
           <a:xfrm>
-            <a:off x="710949" y="1445024"/>
-            <a:ext cx="10572750" cy="1704975"/>
+            <a:off x="735892" y="813496"/>
+            <a:ext cx="10496550" cy="1704975"/>
+          </a:xfrm>
+          <a:prstGeom prst="rect">
+            <a:avLst/>
+          </a:prstGeom>
+        </p:spPr>
+      </p:pic>
+      <p:pic>
+        <p:nvPicPr>
+          <p:cNvPr id="6" name="Picture 5">
+            <a:extLst>
+              <a:ext uri="{FF2B5EF4-FFF2-40B4-BE49-F238E27FC236}">
+                <a16:creationId xmlns:a16="http://schemas.microsoft.com/office/drawing/2014/main" id="{16F6874E-7152-48E9-8460-978FBF86E087}"/>
+              </a:ext>
+            </a:extLst>
+          </p:cNvPr>
+          <p:cNvPicPr>
+            <a:picLocks noChangeAspect="1"/>
+          </p:cNvPicPr>
+          <p:nvPr/>
+        </p:nvPicPr>
+        <p:blipFill>
+          <a:blip r:embed="rId3"/>
+          <a:stretch>
+            <a:fillRect/>
+          </a:stretch>
+        </p:blipFill>
+        <p:spPr>
+          <a:xfrm>
+            <a:off x="7453038" y="3534255"/>
+            <a:ext cx="3169998" cy="1225059"/>
           </a:xfrm>
           <a:prstGeom prst="rect">
             <a:avLst/>
@@ -5257,7 +6457,7 @@
     </p:spTree>
     <p:extLst>
       <p:ext uri="{BB962C8B-B14F-4D97-AF65-F5344CB8AC3E}">
-        <p14:creationId xmlns:p14="http://schemas.microsoft.com/office/powerpoint/2010/main" val="122546289"/>
+        <p14:creationId xmlns:p14="http://schemas.microsoft.com/office/powerpoint/2010/main" val="2141633163"/>
       </p:ext>
     </p:extLst>
   </p:cSld>

</xml_diff>